<commit_message>
updated to Azure WTHack session
</commit_message>
<xml_diff>
--- a/Student/Guides/Challenges.pptx
+++ b/Student/Guides/Challenges.pptx
@@ -5,18 +5,17 @@
     <p:sldMasterId id="2147483648" r:id="rId1"/>
   </p:sldMasterIdLst>
   <p:notesMasterIdLst>
-    <p:notesMasterId r:id="rId11"/>
+    <p:notesMasterId r:id="rId10"/>
   </p:notesMasterIdLst>
   <p:sldIdLst>
     <p:sldId id="256" r:id="rId2"/>
     <p:sldId id="260" r:id="rId3"/>
-    <p:sldId id="259" r:id="rId4"/>
-    <p:sldId id="257" r:id="rId5"/>
-    <p:sldId id="258" r:id="rId6"/>
-    <p:sldId id="262" r:id="rId7"/>
-    <p:sldId id="270" r:id="rId8"/>
-    <p:sldId id="263" r:id="rId9"/>
-    <p:sldId id="264" r:id="rId10"/>
+    <p:sldId id="257" r:id="rId4"/>
+    <p:sldId id="258" r:id="rId5"/>
+    <p:sldId id="262" r:id="rId6"/>
+    <p:sldId id="270" r:id="rId7"/>
+    <p:sldId id="263" r:id="rId8"/>
+    <p:sldId id="264" r:id="rId9"/>
   </p:sldIdLst>
   <p:sldSz cx="12192000" cy="6858000"/>
   <p:notesSz cx="6858000" cy="9144000"/>
@@ -597,7 +596,7 @@
           <a:p>
             <a:fld id="{53D76E38-EB4B-425D-87E0-B33791D2CD91}" type="datetimeFigureOut">
               <a:rPr lang="en-US" smtClean="0"/>
-              <a:t>11/25/2019</a:t>
+              <a:t>1/28/2021</a:t>
             </a:fld>
             <a:endParaRPr lang="en-US"/>
           </a:p>
@@ -929,7 +928,7 @@
           <a:p>
             <a:fld id="{D1ABA2CB-342C-46F9-95EC-88F4F68DF547}" type="slidenum">
               <a:rPr lang="en-US" smtClean="0"/>
-              <a:t>4</a:t>
+              <a:t>3</a:t>
             </a:fld>
             <a:endParaRPr lang="en-US"/>
           </a:p>
@@ -1013,7 +1012,7 @@
           <a:p>
             <a:fld id="{D1ABA2CB-342C-46F9-95EC-88F4F68DF547}" type="slidenum">
               <a:rPr lang="en-US" smtClean="0"/>
-              <a:t>6</a:t>
+              <a:t>5</a:t>
             </a:fld>
             <a:endParaRPr lang="en-US"/>
           </a:p>
@@ -1179,7 +1178,7 @@
           <a:p>
             <a:fld id="{3E3C2F32-47E1-4D90-8C64-89D7BCB0B356}" type="datetimeFigureOut">
               <a:rPr lang="en-US" smtClean="0"/>
-              <a:t>11/25/2019</a:t>
+              <a:t>1/28/2021</a:t>
             </a:fld>
             <a:endParaRPr lang="en-US"/>
           </a:p>
@@ -1377,7 +1376,7 @@
           <a:p>
             <a:fld id="{3E3C2F32-47E1-4D90-8C64-89D7BCB0B356}" type="datetimeFigureOut">
               <a:rPr lang="en-US" smtClean="0"/>
-              <a:t>11/25/2019</a:t>
+              <a:t>1/28/2021</a:t>
             </a:fld>
             <a:endParaRPr lang="en-US"/>
           </a:p>
@@ -1585,7 +1584,7 @@
           <a:p>
             <a:fld id="{3E3C2F32-47E1-4D90-8C64-89D7BCB0B356}" type="datetimeFigureOut">
               <a:rPr lang="en-US" smtClean="0"/>
-              <a:t>11/25/2019</a:t>
+              <a:t>1/28/2021</a:t>
             </a:fld>
             <a:endParaRPr lang="en-US"/>
           </a:p>
@@ -1783,7 +1782,7 @@
           <a:p>
             <a:fld id="{3E3C2F32-47E1-4D90-8C64-89D7BCB0B356}" type="datetimeFigureOut">
               <a:rPr lang="en-US" smtClean="0"/>
-              <a:t>11/25/2019</a:t>
+              <a:t>1/28/2021</a:t>
             </a:fld>
             <a:endParaRPr lang="en-US"/>
           </a:p>
@@ -2058,7 +2057,7 @@
           <a:p>
             <a:fld id="{3E3C2F32-47E1-4D90-8C64-89D7BCB0B356}" type="datetimeFigureOut">
               <a:rPr lang="en-US" smtClean="0"/>
-              <a:t>11/25/2019</a:t>
+              <a:t>1/28/2021</a:t>
             </a:fld>
             <a:endParaRPr lang="en-US"/>
           </a:p>
@@ -2323,7 +2322,7 @@
           <a:p>
             <a:fld id="{3E3C2F32-47E1-4D90-8C64-89D7BCB0B356}" type="datetimeFigureOut">
               <a:rPr lang="en-US" smtClean="0"/>
-              <a:t>11/25/2019</a:t>
+              <a:t>1/28/2021</a:t>
             </a:fld>
             <a:endParaRPr lang="en-US"/>
           </a:p>
@@ -2735,7 +2734,7 @@
           <a:p>
             <a:fld id="{3E3C2F32-47E1-4D90-8C64-89D7BCB0B356}" type="datetimeFigureOut">
               <a:rPr lang="en-US" smtClean="0"/>
-              <a:t>11/25/2019</a:t>
+              <a:t>1/28/2021</a:t>
             </a:fld>
             <a:endParaRPr lang="en-US"/>
           </a:p>
@@ -2876,7 +2875,7 @@
           <a:p>
             <a:fld id="{3E3C2F32-47E1-4D90-8C64-89D7BCB0B356}" type="datetimeFigureOut">
               <a:rPr lang="en-US" smtClean="0"/>
-              <a:t>11/25/2019</a:t>
+              <a:t>1/28/2021</a:t>
             </a:fld>
             <a:endParaRPr lang="en-US"/>
           </a:p>
@@ -2989,7 +2988,7 @@
           <a:p>
             <a:fld id="{3E3C2F32-47E1-4D90-8C64-89D7BCB0B356}" type="datetimeFigureOut">
               <a:rPr lang="en-US" smtClean="0"/>
-              <a:t>11/25/2019</a:t>
+              <a:t>1/28/2021</a:t>
             </a:fld>
             <a:endParaRPr lang="en-US"/>
           </a:p>
@@ -3300,7 +3299,7 @@
           <a:p>
             <a:fld id="{3E3C2F32-47E1-4D90-8C64-89D7BCB0B356}" type="datetimeFigureOut">
               <a:rPr lang="en-US" smtClean="0"/>
-              <a:t>11/25/2019</a:t>
+              <a:t>1/28/2021</a:t>
             </a:fld>
             <a:endParaRPr lang="en-US"/>
           </a:p>
@@ -3588,7 +3587,7 @@
           <a:p>
             <a:fld id="{3E3C2F32-47E1-4D90-8C64-89D7BCB0B356}" type="datetimeFigureOut">
               <a:rPr lang="en-US" smtClean="0"/>
-              <a:t>11/25/2019</a:t>
+              <a:t>1/28/2021</a:t>
             </a:fld>
             <a:endParaRPr lang="en-US"/>
           </a:p>
@@ -3829,7 +3828,7 @@
           <a:p>
             <a:fld id="{3E3C2F32-47E1-4D90-8C64-89D7BCB0B356}" type="datetimeFigureOut">
               <a:rPr lang="en-US" smtClean="0"/>
-              <a:t>11/25/2019</a:t>
+              <a:t>1/28/2021</a:t>
             </a:fld>
             <a:endParaRPr lang="en-US"/>
           </a:p>
@@ -4269,7 +4268,7 @@
           <a:p>
             <a:r>
               <a:rPr lang="en-US" dirty="0"/>
-              <a:t>Azure Monitoring Hackathon (Workshop)</a:t>
+              <a:t>Azure Monitoring Hackathon (WTH)</a:t>
             </a:r>
           </a:p>
         </p:txBody>
@@ -4360,7 +4359,7 @@
           <a:p>
             <a:r>
               <a:rPr lang="en-US" dirty="0"/>
-              <a:t>Agenda – Day 2</a:t>
+              <a:t>Agenda</a:t>
             </a:r>
           </a:p>
         </p:txBody>
@@ -4381,14 +4380,14 @@
             <p:ph idx="1"/>
             <p:extLst>
               <p:ext uri="{D42A27DB-BD31-4B8C-83A1-F6EECF244321}">
-                <p14:modId xmlns:p14="http://schemas.microsoft.com/office/powerpoint/2010/main" val="2378429708"/>
+                <p14:modId xmlns:p14="http://schemas.microsoft.com/office/powerpoint/2010/main" val="3211524018"/>
               </p:ext>
             </p:extLst>
           </p:nvPr>
         </p:nvGraphicFramePr>
         <p:xfrm>
           <a:off x="524656" y="1231132"/>
-          <a:ext cx="11167672" cy="5133066"/>
+          <a:ext cx="11167672" cy="5170982"/>
         </p:xfrm>
         <a:graphic>
           <a:graphicData uri="http://schemas.openxmlformats.org/drawingml/2006/table">
@@ -4647,7 +4646,7 @@
                   </a:ext>
                 </a:extLst>
               </a:tr>
-              <a:tr h="517703">
+              <a:tr h="469360">
                 <a:tc>
                   <a:txBody>
                     <a:bodyPr/>
@@ -4723,7 +4722,7 @@
                   </a:ext>
                 </a:extLst>
               </a:tr>
-              <a:tr h="334407">
+              <a:tr h="470214">
                 <a:tc>
                   <a:txBody>
                     <a:bodyPr/>
@@ -4780,7 +4779,7 @@
                         <a:rPr lang="en-US" sz="2400" u="none" strike="noStrike" dirty="0">
                           <a:effectLst/>
                         </a:rPr>
-                        <a:t>Launch</a:t>
+                        <a:t>Azure Monitor and Alert Rule Challenges</a:t>
                       </a:r>
                       <a:endParaRPr lang="en-US" sz="2400" b="0" i="0" u="none" strike="noStrike" dirty="0">
                         <a:solidFill>
@@ -4799,7 +4798,7 @@
                   </a:ext>
                 </a:extLst>
               </a:tr>
-              <a:tr h="549948">
+              <a:tr h="737787">
                 <a:tc>
                   <a:txBody>
                     <a:bodyPr/>
@@ -4809,6 +4808,9 @@
                       <a:r>
                         <a:rPr lang="ru-RU" sz="2400" b="1" u="none" strike="noStrike">
                           <a:effectLst/>
+                          <a:highlight>
+                            <a:srgbClr val="FFFF00"/>
+                          </a:highlight>
                         </a:rPr>
                         <a:t>13:00</a:t>
                       </a:r>
@@ -4817,6 +4819,9 @@
                           <a:srgbClr val="000000"/>
                         </a:solidFill>
                         <a:effectLst/>
+                        <a:highlight>
+                          <a:srgbClr val="FFFF00"/>
+                        </a:highlight>
                         <a:latin typeface="Calibri" panose="020F0502020204030204" pitchFamily="34" charset="0"/>
                       </a:endParaRPr>
                     </a:p>
@@ -4832,14 +4837,38 @@
                       <a:r>
                         <a:rPr lang="ru-RU" sz="2400" b="1" u="none" strike="noStrike" dirty="0">
                           <a:effectLst/>
+                          <a:highlight>
+                            <a:srgbClr val="FFFF00"/>
+                          </a:highlight>
                         </a:rPr>
-                        <a:t>14:30</a:t>
+                        <a:t>14:</a:t>
+                      </a:r>
+                      <a:r>
+                        <a:rPr lang="en-US" sz="2400" b="1" u="none" strike="noStrike" dirty="0">
+                          <a:effectLst/>
+                          <a:highlight>
+                            <a:srgbClr val="FFFF00"/>
+                          </a:highlight>
+                        </a:rPr>
+                        <a:t>0</a:t>
+                      </a:r>
+                      <a:r>
+                        <a:rPr lang="ru-RU" sz="2400" b="1" u="none" strike="noStrike" dirty="0">
+                          <a:effectLst/>
+                          <a:highlight>
+                            <a:srgbClr val="FFFF00"/>
+                          </a:highlight>
+                        </a:rPr>
+                        <a:t>0</a:t>
                       </a:r>
                       <a:endParaRPr lang="ru-RU" sz="2400" b="1" i="0" u="none" strike="noStrike" dirty="0">
                         <a:solidFill>
                           <a:srgbClr val="000000"/>
                         </a:solidFill>
                         <a:effectLst/>
+                        <a:highlight>
+                          <a:srgbClr val="FFFF00"/>
+                        </a:highlight>
                         <a:latin typeface="Calibri" panose="020F0502020204030204" pitchFamily="34" charset="0"/>
                       </a:endParaRPr>
                     </a:p>
@@ -4853,18 +4882,18 @@
                     <a:p>
                       <a:pPr algn="l" fontAlgn="b"/>
                       <a:r>
-                        <a:rPr lang="en-US" sz="2400" u="none" strike="noStrike" dirty="0">
+                        <a:rPr lang="en-US" sz="2400" b="0" i="0" u="none" strike="noStrike" dirty="0">
+                          <a:solidFill>
+                            <a:srgbClr val="000000"/>
+                          </a:solidFill>
                           <a:effectLst/>
+                          <a:highlight>
+                            <a:srgbClr val="FFFF00"/>
+                          </a:highlight>
+                          <a:latin typeface="Calibri" panose="020F0502020204030204" pitchFamily="34" charset="0"/>
                         </a:rPr>
-                        <a:t>Azure Monitor and Alert Rule Challenges</a:t>
+                        <a:t>Lunch</a:t>
                       </a:r>
-                      <a:endParaRPr lang="en-US" sz="2400" b="0" i="0" u="none" strike="noStrike" dirty="0">
-                        <a:solidFill>
-                          <a:srgbClr val="000000"/>
-                        </a:solidFill>
-                        <a:effectLst/>
-                        <a:latin typeface="Calibri" panose="020F0502020204030204" pitchFamily="34" charset="0"/>
-                      </a:endParaRPr>
                     </a:p>
                   </a:txBody>
                   <a:tcPr marL="6350" marR="6350" marT="6350" marB="0" anchor="b"/>
@@ -4875,7 +4904,7 @@
                   </a:ext>
                 </a:extLst>
               </a:tr>
-              <a:tr h="334407">
+              <a:tr h="465217">
                 <a:tc>
                   <a:txBody>
                     <a:bodyPr/>
@@ -4883,12 +4912,18 @@
                     <a:p>
                       <a:pPr algn="ctr" fontAlgn="b"/>
                       <a:r>
-                        <a:rPr lang="ru-RU" sz="2400" b="1" u="none" strike="noStrike">
+                        <a:rPr lang="ru-RU" sz="2400" b="1" u="none" strike="noStrike" dirty="0">
                           <a:effectLst/>
                         </a:rPr>
-                        <a:t>14:30</a:t>
+                        <a:t>14:</a:t>
                       </a:r>
-                      <a:endParaRPr lang="ru-RU" sz="2400" b="1" i="0" u="none" strike="noStrike">
+                      <a:r>
+                        <a:rPr lang="en-US" sz="2400" b="1" u="none" strike="noStrike" dirty="0">
+                          <a:effectLst/>
+                        </a:rPr>
+                        <a:t>00</a:t>
+                      </a:r>
+                      <a:endParaRPr lang="ru-RU" sz="2400" b="1" i="0" u="none" strike="noStrike" dirty="0">
                         <a:solidFill>
                           <a:srgbClr val="000000"/>
                         </a:solidFill>
@@ -4927,12 +4962,28 @@
                     <a:bodyPr/>
                     <a:lstStyle/>
                     <a:p>
-                      <a:pPr algn="l" fontAlgn="b"/>
+                      <a:pPr marL="0" marR="0" lvl="0" indent="0" algn="l" defTabSz="914400" rtl="0" eaLnBrk="1" fontAlgn="b" latinLnBrk="0" hangingPunct="1">
+                        <a:lnSpc>
+                          <a:spcPct val="100000"/>
+                        </a:lnSpc>
+                        <a:spcBef>
+                          <a:spcPts val="0"/>
+                        </a:spcBef>
+                        <a:spcAft>
+                          <a:spcPts val="0"/>
+                        </a:spcAft>
+                        <a:buClrTx/>
+                        <a:buSzTx/>
+                        <a:buFontTx/>
+                        <a:buNone/>
+                        <a:tabLst/>
+                        <a:defRPr/>
+                      </a:pPr>
                       <a:r>
                         <a:rPr lang="en-US" sz="2400" u="none" strike="noStrike" dirty="0">
                           <a:effectLst/>
                         </a:rPr>
-                        <a:t>Break</a:t>
+                        <a:t>Monitoring and Alert Rule Automation Challenge</a:t>
                       </a:r>
                       <a:endParaRPr lang="en-US" sz="2400" b="0" i="0" u="none" strike="noStrike" dirty="0">
                         <a:solidFill>
@@ -4951,7 +5002,7 @@
                   </a:ext>
                 </a:extLst>
               </a:tr>
-              <a:tr h="991809">
+              <a:tr h="527050">
                 <a:tc>
                   <a:txBody>
                     <a:bodyPr/>
@@ -4959,12 +5010,18 @@
                     <a:p>
                       <a:pPr algn="ctr" fontAlgn="b"/>
                       <a:r>
-                        <a:rPr lang="ru-RU" sz="2400" b="1" u="none" strike="noStrike">
+                        <a:rPr lang="en-US" sz="2400" b="1" u="none" strike="noStrike" dirty="0">
                           <a:effectLst/>
                         </a:rPr>
-                        <a:t>14:45</a:t>
+                        <a:t>1</a:t>
                       </a:r>
-                      <a:endParaRPr lang="ru-RU" sz="2400" b="1" i="0" u="none" strike="noStrike">
+                      <a:r>
+                        <a:rPr lang="ru-RU" sz="2400" b="1" u="none" strike="noStrike" dirty="0">
+                          <a:effectLst/>
+                        </a:rPr>
+                        <a:t>4:45</a:t>
+                      </a:r>
+                      <a:endParaRPr lang="ru-RU" sz="2400" b="1" i="0" u="none" strike="noStrike" dirty="0">
                         <a:solidFill>
                           <a:srgbClr val="000000"/>
                         </a:solidFill>
@@ -5003,29 +5060,33 @@
                     <a:bodyPr/>
                     <a:lstStyle/>
                     <a:p>
-                      <a:pPr algn="l" fontAlgn="b"/>
+                      <a:pPr marL="0" marR="0" lvl="0" indent="0" algn="l" defTabSz="914400" rtl="0" eaLnBrk="1" fontAlgn="b" latinLnBrk="0" hangingPunct="1">
+                        <a:lnSpc>
+                          <a:spcPct val="100000"/>
+                        </a:lnSpc>
+                        <a:spcBef>
+                          <a:spcPts val="0"/>
+                        </a:spcBef>
+                        <a:spcAft>
+                          <a:spcPts val="0"/>
+                        </a:spcAft>
+                        <a:buClrTx/>
+                        <a:buSzTx/>
+                        <a:buFontTx/>
+                        <a:buNone/>
+                        <a:tabLst/>
+                        <a:defRPr/>
+                      </a:pPr>
                       <a:r>
-                        <a:rPr lang="en-US" sz="2400" u="none" strike="noStrike" dirty="0">
+                        <a:rPr lang="en-US" sz="2400" b="0" i="0" u="none" strike="noStrike" dirty="0">
+                          <a:solidFill>
+                            <a:srgbClr val="000000"/>
+                          </a:solidFill>
                           <a:effectLst/>
+                          <a:latin typeface="Calibri" panose="020F0502020204030204" pitchFamily="34" charset="0"/>
                         </a:rPr>
-                        <a:t>Azure Monitor and Alert Rule Challenges (continue)\</a:t>
+                        <a:t>Log Analytics Challenge</a:t>
                       </a:r>
-                    </a:p>
-                    <a:p>
-                      <a:pPr algn="l" fontAlgn="b"/>
-                      <a:r>
-                        <a:rPr lang="en-US" sz="2400" u="none" strike="noStrike" dirty="0">
-                          <a:effectLst/>
-                        </a:rPr>
-                        <a:t>Monitoring and Alert Rule Automation Challenge</a:t>
-                      </a:r>
-                      <a:endParaRPr lang="en-US" sz="2400" b="0" i="0" u="none" strike="noStrike" dirty="0">
-                        <a:solidFill>
-                          <a:srgbClr val="000000"/>
-                        </a:solidFill>
-                        <a:effectLst/>
-                        <a:latin typeface="Calibri" panose="020F0502020204030204" pitchFamily="34" charset="0"/>
-                      </a:endParaRPr>
                     </a:p>
                   </a:txBody>
                   <a:tcPr marL="6350" marR="6350" marT="6350" marB="0" anchor="b"/>
@@ -5036,7 +5097,7 @@
                   </a:ext>
                 </a:extLst>
               </a:tr>
-              <a:tr h="334407">
+              <a:tr h="544078">
                 <a:tc>
                   <a:txBody>
                     <a:bodyPr/>
@@ -5146,7 +5207,19 @@
                         <a:rPr lang="ru-RU" sz="2400" b="1" u="none" strike="noStrike" dirty="0">
                           <a:effectLst/>
                         </a:rPr>
-                        <a:t>17:00</a:t>
+                        <a:t>1</a:t>
+                      </a:r>
+                      <a:r>
+                        <a:rPr lang="en-US" sz="2400" b="1" u="none" strike="noStrike" dirty="0">
+                          <a:effectLst/>
+                        </a:rPr>
+                        <a:t>8</a:t>
+                      </a:r>
+                      <a:r>
+                        <a:rPr lang="ru-RU" sz="2400" b="1" u="none" strike="noStrike" dirty="0">
+                          <a:effectLst/>
+                        </a:rPr>
+                        <a:t>:00</a:t>
                       </a:r>
                       <a:endParaRPr lang="ru-RU" sz="2400" b="1" i="0" u="none" strike="noStrike" dirty="0">
                         <a:solidFill>
@@ -5164,12 +5237,38 @@
                     <a:bodyPr/>
                     <a:lstStyle/>
                     <a:p>
-                      <a:pPr algn="l" fontAlgn="b"/>
+                      <a:pPr marL="0" marR="0" lvl="0" indent="0" algn="l" defTabSz="914400" rtl="0" eaLnBrk="1" fontAlgn="b" latinLnBrk="0" hangingPunct="1">
+                        <a:lnSpc>
+                          <a:spcPct val="100000"/>
+                        </a:lnSpc>
+                        <a:spcBef>
+                          <a:spcPts val="0"/>
+                        </a:spcBef>
+                        <a:spcAft>
+                          <a:spcPts val="0"/>
+                        </a:spcAft>
+                        <a:buClrTx/>
+                        <a:buSzTx/>
+                        <a:buFontTx/>
+                        <a:buNone/>
+                        <a:tabLst/>
+                        <a:defRPr/>
+                      </a:pPr>
+                      <a:r>
+                        <a:rPr lang="en-US" sz="2400" b="0" i="0" u="none" strike="noStrike" dirty="0">
+                          <a:solidFill>
+                            <a:srgbClr val="000000"/>
+                          </a:solidFill>
+                          <a:effectLst/>
+                          <a:latin typeface="Calibri" panose="020F0502020204030204" pitchFamily="34" charset="0"/>
+                        </a:rPr>
+                        <a:t>Log Analytics Challenge\</a:t>
+                      </a:r>
                       <a:r>
                         <a:rPr lang="en-US" sz="2400" u="none" strike="noStrike" dirty="0">
                           <a:effectLst/>
                         </a:rPr>
-                        <a:t>Monitoring and Alert Rule Automation Challenge (continue)</a:t>
+                        <a:t>Azure Dashboard Challenge</a:t>
                       </a:r>
                       <a:endParaRPr lang="en-US" sz="2400" b="0" i="0" u="none" strike="noStrike" dirty="0">
                         <a:solidFill>
@@ -5227,810 +5326,6 @@
           <p:cNvPr id="2" name="Title 1">
             <a:extLst>
               <a:ext uri="{FF2B5EF4-FFF2-40B4-BE49-F238E27FC236}">
-                <a16:creationId xmlns:a16="http://schemas.microsoft.com/office/drawing/2014/main" id="{E8F0ADB5-C39C-47EE-BD09-8A4FB135B11C}"/>
-              </a:ext>
-            </a:extLst>
-          </p:cNvPr>
-          <p:cNvSpPr>
-            <a:spLocks noGrp="1"/>
-          </p:cNvSpPr>
-          <p:nvPr>
-            <p:ph type="title"/>
-          </p:nvPr>
-        </p:nvSpPr>
-        <p:spPr>
-          <a:xfrm>
-            <a:off x="838200" y="365126"/>
-            <a:ext cx="10515600" cy="721662"/>
-          </a:xfrm>
-        </p:spPr>
-        <p:txBody>
-          <a:bodyPr/>
-          <a:lstStyle/>
-          <a:p>
-            <a:r>
-              <a:rPr lang="en-US" dirty="0"/>
-              <a:t>Agenda – Day 3</a:t>
-            </a:r>
-          </a:p>
-        </p:txBody>
-      </p:sp>
-      <p:graphicFrame>
-        <p:nvGraphicFramePr>
-          <p:cNvPr id="6" name="Table 5">
-            <a:extLst>
-              <a:ext uri="{FF2B5EF4-FFF2-40B4-BE49-F238E27FC236}">
-                <a16:creationId xmlns:a16="http://schemas.microsoft.com/office/drawing/2014/main" id="{3700D729-DEEF-4F26-A68E-CC1DD9AB30BE}"/>
-              </a:ext>
-            </a:extLst>
-          </p:cNvPr>
-          <p:cNvGraphicFramePr>
-            <a:graphicFrameLocks noGrp="1"/>
-          </p:cNvGraphicFramePr>
-          <p:nvPr>
-            <p:extLst>
-              <p:ext uri="{D42A27DB-BD31-4B8C-83A1-F6EECF244321}">
-                <p14:modId xmlns:p14="http://schemas.microsoft.com/office/powerpoint/2010/main" val="2009797203"/>
-              </p:ext>
-            </p:extLst>
-          </p:nvPr>
-        </p:nvGraphicFramePr>
-        <p:xfrm>
-          <a:off x="292308" y="1229194"/>
-          <a:ext cx="11429999" cy="4323587"/>
-        </p:xfrm>
-        <a:graphic>
-          <a:graphicData uri="http://schemas.openxmlformats.org/drawingml/2006/table">
-            <a:tbl>
-              <a:tblPr>
-                <a:tableStyleId>{5C22544A-7EE6-4342-B048-85BDC9FD1C3A}</a:tableStyleId>
-              </a:tblPr>
-              <a:tblGrid>
-                <a:gridCol w="1406769">
-                  <a:extLst>
-                    <a:ext uri="{9D8B030D-6E8A-4147-A177-3AD203B41FA5}">
-                      <a16:colId xmlns:a16="http://schemas.microsoft.com/office/drawing/2014/main" val="2568748957"/>
-                    </a:ext>
-                  </a:extLst>
-                </a:gridCol>
-                <a:gridCol w="1406769">
-                  <a:extLst>
-                    <a:ext uri="{9D8B030D-6E8A-4147-A177-3AD203B41FA5}">
-                      <a16:colId xmlns:a16="http://schemas.microsoft.com/office/drawing/2014/main" val="2904687513"/>
-                    </a:ext>
-                  </a:extLst>
-                </a:gridCol>
-                <a:gridCol w="8616461">
-                  <a:extLst>
-                    <a:ext uri="{9D8B030D-6E8A-4147-A177-3AD203B41FA5}">
-                      <a16:colId xmlns:a16="http://schemas.microsoft.com/office/drawing/2014/main" val="3112273837"/>
-                    </a:ext>
-                  </a:extLst>
-                </a:gridCol>
-              </a:tblGrid>
-              <a:tr h="408387">
-                <a:tc>
-                  <a:txBody>
-                    <a:bodyPr/>
-                    <a:lstStyle/>
-                    <a:p>
-                      <a:pPr algn="ctr" fontAlgn="ctr"/>
-                      <a:r>
-                        <a:rPr lang="en-US" sz="2400" u="none" strike="noStrike" dirty="0">
-                          <a:effectLst/>
-                        </a:rPr>
-                        <a:t>start</a:t>
-                      </a:r>
-                      <a:endParaRPr lang="en-US" sz="2400" b="1" i="0" u="none" strike="noStrike" dirty="0">
-                        <a:solidFill>
-                          <a:srgbClr val="FFFFFF"/>
-                        </a:solidFill>
-                        <a:effectLst/>
-                        <a:latin typeface="Calibri" panose="020F0502020204030204" pitchFamily="34" charset="0"/>
-                      </a:endParaRPr>
-                    </a:p>
-                  </a:txBody>
-                  <a:tcPr marL="6350" marR="6350" marT="6350" marB="0" anchor="ctr"/>
-                </a:tc>
-                <a:tc>
-                  <a:txBody>
-                    <a:bodyPr/>
-                    <a:lstStyle/>
-                    <a:p>
-                      <a:pPr algn="ctr" fontAlgn="ctr"/>
-                      <a:r>
-                        <a:rPr lang="en-US" sz="2400" u="none" strike="noStrike" dirty="0">
-                          <a:effectLst/>
-                        </a:rPr>
-                        <a:t>end</a:t>
-                      </a:r>
-                      <a:endParaRPr lang="en-US" sz="2400" b="1" i="0" u="none" strike="noStrike" dirty="0">
-                        <a:solidFill>
-                          <a:srgbClr val="FFFFFF"/>
-                        </a:solidFill>
-                        <a:effectLst/>
-                        <a:latin typeface="Calibri" panose="020F0502020204030204" pitchFamily="34" charset="0"/>
-                      </a:endParaRPr>
-                    </a:p>
-                  </a:txBody>
-                  <a:tcPr marL="6350" marR="6350" marT="6350" marB="0" anchor="ctr"/>
-                </a:tc>
-                <a:tc>
-                  <a:txBody>
-                    <a:bodyPr/>
-                    <a:lstStyle/>
-                    <a:p>
-                      <a:pPr algn="ctr" fontAlgn="ctr"/>
-                      <a:r>
-                        <a:rPr lang="en-US" sz="2400" u="none" strike="noStrike">
-                          <a:effectLst/>
-                        </a:rPr>
-                        <a:t>Activity</a:t>
-                      </a:r>
-                      <a:endParaRPr lang="en-US" sz="2400" b="1" i="0" u="none" strike="noStrike">
-                        <a:solidFill>
-                          <a:srgbClr val="FFFFFF"/>
-                        </a:solidFill>
-                        <a:effectLst/>
-                        <a:latin typeface="Calibri" panose="020F0502020204030204" pitchFamily="34" charset="0"/>
-                      </a:endParaRPr>
-                    </a:p>
-                  </a:txBody>
-                  <a:tcPr marL="6350" marR="6350" marT="6350" marB="0" anchor="ctr"/>
-                </a:tc>
-                <a:extLst>
-                  <a:ext uri="{0D108BD9-81ED-4DB2-BD59-A6C34878D82A}">
-                    <a16:rowId xmlns:a16="http://schemas.microsoft.com/office/drawing/2014/main" val="1718993486"/>
-                  </a:ext>
-                </a:extLst>
-              </a:tr>
-              <a:tr h="408387">
-                <a:tc>
-                  <a:txBody>
-                    <a:bodyPr/>
-                    <a:lstStyle/>
-                    <a:p>
-                      <a:pPr algn="ctr" fontAlgn="b"/>
-                      <a:r>
-                        <a:rPr lang="ru-RU" sz="2400" b="1" u="none" strike="noStrike" dirty="0">
-                          <a:effectLst/>
-                        </a:rPr>
-                        <a:t>9:30</a:t>
-                      </a:r>
-                      <a:endParaRPr lang="ru-RU" sz="2400" b="1" i="0" u="none" strike="noStrike" dirty="0">
-                        <a:solidFill>
-                          <a:srgbClr val="000000"/>
-                        </a:solidFill>
-                        <a:effectLst/>
-                        <a:latin typeface="Calibri" panose="020F0502020204030204" pitchFamily="34" charset="0"/>
-                      </a:endParaRPr>
-                    </a:p>
-                  </a:txBody>
-                  <a:tcPr marL="6350" marR="6350" marT="6350" marB="0" anchor="b"/>
-                </a:tc>
-                <a:tc>
-                  <a:txBody>
-                    <a:bodyPr/>
-                    <a:lstStyle/>
-                    <a:p>
-                      <a:pPr algn="ctr" fontAlgn="b"/>
-                      <a:r>
-                        <a:rPr lang="ru-RU" sz="2400" b="1" u="none" strike="noStrike" dirty="0">
-                          <a:effectLst/>
-                        </a:rPr>
-                        <a:t>10:00</a:t>
-                      </a:r>
-                      <a:endParaRPr lang="ru-RU" sz="2400" b="1" i="0" u="none" strike="noStrike" dirty="0">
-                        <a:solidFill>
-                          <a:srgbClr val="000000"/>
-                        </a:solidFill>
-                        <a:effectLst/>
-                        <a:latin typeface="Calibri" panose="020F0502020204030204" pitchFamily="34" charset="0"/>
-                      </a:endParaRPr>
-                    </a:p>
-                  </a:txBody>
-                  <a:tcPr marL="6350" marR="6350" marT="6350" marB="0" anchor="b"/>
-                </a:tc>
-                <a:tc>
-                  <a:txBody>
-                    <a:bodyPr/>
-                    <a:lstStyle/>
-                    <a:p>
-                      <a:pPr algn="l" fontAlgn="b"/>
-                      <a:r>
-                        <a:rPr lang="en-US" sz="2400" u="none" strike="noStrike" dirty="0">
-                          <a:effectLst/>
-                        </a:rPr>
-                        <a:t>Welcome coffee </a:t>
-                      </a:r>
-                      <a:endParaRPr lang="en-US" sz="2400" b="0" i="0" u="none" strike="noStrike" dirty="0">
-                        <a:solidFill>
-                          <a:srgbClr val="000000"/>
-                        </a:solidFill>
-                        <a:effectLst/>
-                        <a:latin typeface="Calibri" panose="020F0502020204030204" pitchFamily="34" charset="0"/>
-                      </a:endParaRPr>
-                    </a:p>
-                  </a:txBody>
-                  <a:tcPr marL="6350" marR="6350" marT="6350" marB="0" anchor="b"/>
-                </a:tc>
-                <a:extLst>
-                  <a:ext uri="{0D108BD9-81ED-4DB2-BD59-A6C34878D82A}">
-                    <a16:rowId xmlns:a16="http://schemas.microsoft.com/office/drawing/2014/main" val="2264698228"/>
-                  </a:ext>
-                </a:extLst>
-              </a:tr>
-              <a:tr h="487370">
-                <a:tc>
-                  <a:txBody>
-                    <a:bodyPr/>
-                    <a:lstStyle/>
-                    <a:p>
-                      <a:pPr algn="ctr" fontAlgn="b"/>
-                      <a:r>
-                        <a:rPr lang="ru-RU" sz="2400" b="1" u="none" strike="noStrike">
-                          <a:effectLst/>
-                        </a:rPr>
-                        <a:t>10:00</a:t>
-                      </a:r>
-                      <a:endParaRPr lang="ru-RU" sz="2400" b="1" i="0" u="none" strike="noStrike">
-                        <a:solidFill>
-                          <a:srgbClr val="000000"/>
-                        </a:solidFill>
-                        <a:effectLst/>
-                        <a:latin typeface="Calibri" panose="020F0502020204030204" pitchFamily="34" charset="0"/>
-                      </a:endParaRPr>
-                    </a:p>
-                  </a:txBody>
-                  <a:tcPr marL="6350" marR="6350" marT="6350" marB="0" anchor="b"/>
-                </a:tc>
-                <a:tc>
-                  <a:txBody>
-                    <a:bodyPr/>
-                    <a:lstStyle/>
-                    <a:p>
-                      <a:pPr algn="ctr" fontAlgn="b"/>
-                      <a:r>
-                        <a:rPr lang="ru-RU" sz="2400" b="1" u="none" strike="noStrike" dirty="0">
-                          <a:effectLst/>
-                        </a:rPr>
-                        <a:t>10:30</a:t>
-                      </a:r>
-                      <a:endParaRPr lang="ru-RU" sz="2400" b="1" i="0" u="none" strike="noStrike" dirty="0">
-                        <a:solidFill>
-                          <a:srgbClr val="000000"/>
-                        </a:solidFill>
-                        <a:effectLst/>
-                        <a:latin typeface="Calibri" panose="020F0502020204030204" pitchFamily="34" charset="0"/>
-                      </a:endParaRPr>
-                    </a:p>
-                  </a:txBody>
-                  <a:tcPr marL="6350" marR="6350" marT="6350" marB="0" anchor="b"/>
-                </a:tc>
-                <a:tc>
-                  <a:txBody>
-                    <a:bodyPr/>
-                    <a:lstStyle/>
-                    <a:p>
-                      <a:pPr algn="l" fontAlgn="b"/>
-                      <a:r>
-                        <a:rPr lang="en-US" sz="2400" u="none" strike="noStrike" dirty="0">
-                          <a:effectLst/>
-                        </a:rPr>
-                        <a:t>Team Sync (what did you learn from Day 2?, how did it go?, blocked?)</a:t>
-                      </a:r>
-                      <a:endParaRPr lang="en-US" sz="2400" b="0" i="0" u="none" strike="noStrike" dirty="0">
-                        <a:solidFill>
-                          <a:srgbClr val="000000"/>
-                        </a:solidFill>
-                        <a:effectLst/>
-                        <a:latin typeface="Calibri" panose="020F0502020204030204" pitchFamily="34" charset="0"/>
-                      </a:endParaRPr>
-                    </a:p>
-                  </a:txBody>
-                  <a:tcPr marL="6350" marR="6350" marT="6350" marB="0" anchor="b"/>
-                </a:tc>
-                <a:extLst>
-                  <a:ext uri="{0D108BD9-81ED-4DB2-BD59-A6C34878D82A}">
-                    <a16:rowId xmlns:a16="http://schemas.microsoft.com/office/drawing/2014/main" val="536306581"/>
-                  </a:ext>
-                </a:extLst>
-              </a:tr>
-              <a:tr h="584471">
-                <a:tc>
-                  <a:txBody>
-                    <a:bodyPr/>
-                    <a:lstStyle/>
-                    <a:p>
-                      <a:pPr algn="ctr" fontAlgn="b"/>
-                      <a:r>
-                        <a:rPr lang="ru-RU" sz="2400" b="1" u="none" strike="noStrike" dirty="0">
-                          <a:effectLst/>
-                        </a:rPr>
-                        <a:t>10:30</a:t>
-                      </a:r>
-                      <a:endParaRPr lang="ru-RU" sz="2400" b="1" i="0" u="none" strike="noStrike" dirty="0">
-                        <a:solidFill>
-                          <a:srgbClr val="000000"/>
-                        </a:solidFill>
-                        <a:effectLst/>
-                        <a:latin typeface="Calibri" panose="020F0502020204030204" pitchFamily="34" charset="0"/>
-                      </a:endParaRPr>
-                    </a:p>
-                  </a:txBody>
-                  <a:tcPr marL="6350" marR="6350" marT="6350" marB="0" anchor="b"/>
-                </a:tc>
-                <a:tc>
-                  <a:txBody>
-                    <a:bodyPr/>
-                    <a:lstStyle/>
-                    <a:p>
-                      <a:pPr algn="ctr" fontAlgn="b"/>
-                      <a:r>
-                        <a:rPr lang="ru-RU" sz="2400" b="1" u="none" strike="noStrike" dirty="0">
-                          <a:effectLst/>
-                        </a:rPr>
-                        <a:t>11:15</a:t>
-                      </a:r>
-                      <a:endParaRPr lang="ru-RU" sz="2400" b="1" i="0" u="none" strike="noStrike" dirty="0">
-                        <a:solidFill>
-                          <a:srgbClr val="000000"/>
-                        </a:solidFill>
-                        <a:effectLst/>
-                        <a:latin typeface="Calibri" panose="020F0502020204030204" pitchFamily="34" charset="0"/>
-                      </a:endParaRPr>
-                    </a:p>
-                  </a:txBody>
-                  <a:tcPr marL="6350" marR="6350" marT="6350" marB="0" anchor="b"/>
-                </a:tc>
-                <a:tc>
-                  <a:txBody>
-                    <a:bodyPr/>
-                    <a:lstStyle/>
-                    <a:p>
-                      <a:pPr algn="l" fontAlgn="b"/>
-                      <a:r>
-                        <a:rPr lang="en-US" sz="2400" u="none" strike="noStrike" dirty="0">
-                          <a:effectLst/>
-                        </a:rPr>
-                        <a:t>Log Analytics Overview</a:t>
-                      </a:r>
-                      <a:endParaRPr lang="en-US" sz="2400" b="0" i="0" u="none" strike="noStrike" dirty="0">
-                        <a:solidFill>
-                          <a:srgbClr val="000000"/>
-                        </a:solidFill>
-                        <a:effectLst/>
-                        <a:latin typeface="Calibri" panose="020F0502020204030204" pitchFamily="34" charset="0"/>
-                      </a:endParaRPr>
-                    </a:p>
-                  </a:txBody>
-                  <a:tcPr marL="6350" marR="6350" marT="6350" marB="0" anchor="b"/>
-                </a:tc>
-                <a:extLst>
-                  <a:ext uri="{0D108BD9-81ED-4DB2-BD59-A6C34878D82A}">
-                    <a16:rowId xmlns:a16="http://schemas.microsoft.com/office/drawing/2014/main" val="1062882228"/>
-                  </a:ext>
-                </a:extLst>
-              </a:tr>
-              <a:tr h="408387">
-                <a:tc>
-                  <a:txBody>
-                    <a:bodyPr/>
-                    <a:lstStyle/>
-                    <a:p>
-                      <a:pPr algn="ctr" fontAlgn="b"/>
-                      <a:r>
-                        <a:rPr lang="ru-RU" sz="2400" b="1" u="none" strike="noStrike">
-                          <a:effectLst/>
-                        </a:rPr>
-                        <a:t>11:15</a:t>
-                      </a:r>
-                      <a:endParaRPr lang="ru-RU" sz="2400" b="1" i="0" u="none" strike="noStrike">
-                        <a:solidFill>
-                          <a:srgbClr val="000000"/>
-                        </a:solidFill>
-                        <a:effectLst/>
-                        <a:latin typeface="Calibri" panose="020F0502020204030204" pitchFamily="34" charset="0"/>
-                      </a:endParaRPr>
-                    </a:p>
-                  </a:txBody>
-                  <a:tcPr marL="6350" marR="6350" marT="6350" marB="0" anchor="b"/>
-                </a:tc>
-                <a:tc>
-                  <a:txBody>
-                    <a:bodyPr/>
-                    <a:lstStyle/>
-                    <a:p>
-                      <a:pPr algn="ctr" fontAlgn="b"/>
-                      <a:r>
-                        <a:rPr lang="ru-RU" sz="2400" b="1" u="none" strike="noStrike" dirty="0">
-                          <a:effectLst/>
-                        </a:rPr>
-                        <a:t>12:00</a:t>
-                      </a:r>
-                      <a:endParaRPr lang="ru-RU" sz="2400" b="1" i="0" u="none" strike="noStrike" dirty="0">
-                        <a:solidFill>
-                          <a:srgbClr val="000000"/>
-                        </a:solidFill>
-                        <a:effectLst/>
-                        <a:latin typeface="Calibri" panose="020F0502020204030204" pitchFamily="34" charset="0"/>
-                      </a:endParaRPr>
-                    </a:p>
-                  </a:txBody>
-                  <a:tcPr marL="6350" marR="6350" marT="6350" marB="0" anchor="b"/>
-                </a:tc>
-                <a:tc>
-                  <a:txBody>
-                    <a:bodyPr/>
-                    <a:lstStyle/>
-                    <a:p>
-                      <a:pPr algn="l" fontAlgn="b"/>
-                      <a:r>
-                        <a:rPr lang="en-US" sz="2400" u="none" strike="noStrike" dirty="0">
-                          <a:effectLst/>
-                        </a:rPr>
-                        <a:t>Log Analytics Challenges Start</a:t>
-                      </a:r>
-                      <a:endParaRPr lang="en-US" sz="2400" b="0" i="0" u="none" strike="noStrike" dirty="0">
-                        <a:solidFill>
-                          <a:srgbClr val="000000"/>
-                        </a:solidFill>
-                        <a:effectLst/>
-                        <a:latin typeface="Calibri" panose="020F0502020204030204" pitchFamily="34" charset="0"/>
-                      </a:endParaRPr>
-                    </a:p>
-                  </a:txBody>
-                  <a:tcPr marL="6350" marR="6350" marT="6350" marB="0" anchor="b"/>
-                </a:tc>
-                <a:extLst>
-                  <a:ext uri="{0D108BD9-81ED-4DB2-BD59-A6C34878D82A}">
-                    <a16:rowId xmlns:a16="http://schemas.microsoft.com/office/drawing/2014/main" val="2564313752"/>
-                  </a:ext>
-                </a:extLst>
-              </a:tr>
-              <a:tr h="408387">
-                <a:tc>
-                  <a:txBody>
-                    <a:bodyPr/>
-                    <a:lstStyle/>
-                    <a:p>
-                      <a:pPr algn="ctr" fontAlgn="b"/>
-                      <a:r>
-                        <a:rPr lang="ru-RU" sz="2400" b="1" u="none" strike="noStrike">
-                          <a:effectLst/>
-                        </a:rPr>
-                        <a:t>12:00</a:t>
-                      </a:r>
-                      <a:endParaRPr lang="ru-RU" sz="2400" b="1" i="0" u="none" strike="noStrike">
-                        <a:solidFill>
-                          <a:srgbClr val="000000"/>
-                        </a:solidFill>
-                        <a:effectLst/>
-                        <a:latin typeface="Calibri" panose="020F0502020204030204" pitchFamily="34" charset="0"/>
-                      </a:endParaRPr>
-                    </a:p>
-                  </a:txBody>
-                  <a:tcPr marL="6350" marR="6350" marT="6350" marB="0" anchor="b"/>
-                </a:tc>
-                <a:tc>
-                  <a:txBody>
-                    <a:bodyPr/>
-                    <a:lstStyle/>
-                    <a:p>
-                      <a:pPr algn="ctr" fontAlgn="b"/>
-                      <a:r>
-                        <a:rPr lang="ru-RU" sz="2400" b="1" u="none" strike="noStrike" dirty="0">
-                          <a:effectLst/>
-                        </a:rPr>
-                        <a:t>13:00</a:t>
-                      </a:r>
-                      <a:endParaRPr lang="ru-RU" sz="2400" b="1" i="0" u="none" strike="noStrike" dirty="0">
-                        <a:solidFill>
-                          <a:srgbClr val="000000"/>
-                        </a:solidFill>
-                        <a:effectLst/>
-                        <a:latin typeface="Calibri" panose="020F0502020204030204" pitchFamily="34" charset="0"/>
-                      </a:endParaRPr>
-                    </a:p>
-                  </a:txBody>
-                  <a:tcPr marL="6350" marR="6350" marT="6350" marB="0" anchor="b"/>
-                </a:tc>
-                <a:tc>
-                  <a:txBody>
-                    <a:bodyPr/>
-                    <a:lstStyle/>
-                    <a:p>
-                      <a:pPr algn="l" fontAlgn="b"/>
-                      <a:r>
-                        <a:rPr lang="en-US" sz="2400" u="none" strike="noStrike" dirty="0">
-                          <a:effectLst/>
-                        </a:rPr>
-                        <a:t>Launch</a:t>
-                      </a:r>
-                      <a:endParaRPr lang="en-US" sz="2400" b="0" i="0" u="none" strike="noStrike" dirty="0">
-                        <a:solidFill>
-                          <a:srgbClr val="000000"/>
-                        </a:solidFill>
-                        <a:effectLst/>
-                        <a:latin typeface="Calibri" panose="020F0502020204030204" pitchFamily="34" charset="0"/>
-                      </a:endParaRPr>
-                    </a:p>
-                  </a:txBody>
-                  <a:tcPr marL="6350" marR="6350" marT="6350" marB="0" anchor="b"/>
-                </a:tc>
-                <a:extLst>
-                  <a:ext uri="{0D108BD9-81ED-4DB2-BD59-A6C34878D82A}">
-                    <a16:rowId xmlns:a16="http://schemas.microsoft.com/office/drawing/2014/main" val="3810771615"/>
-                  </a:ext>
-                </a:extLst>
-              </a:tr>
-              <a:tr h="408387">
-                <a:tc>
-                  <a:txBody>
-                    <a:bodyPr/>
-                    <a:lstStyle/>
-                    <a:p>
-                      <a:pPr algn="ctr" fontAlgn="b"/>
-                      <a:r>
-                        <a:rPr lang="ru-RU" sz="2400" b="1" u="none" strike="noStrike">
-                          <a:effectLst/>
-                        </a:rPr>
-                        <a:t>13:00</a:t>
-                      </a:r>
-                      <a:endParaRPr lang="ru-RU" sz="2400" b="1" i="0" u="none" strike="noStrike">
-                        <a:solidFill>
-                          <a:srgbClr val="000000"/>
-                        </a:solidFill>
-                        <a:effectLst/>
-                        <a:latin typeface="Calibri" panose="020F0502020204030204" pitchFamily="34" charset="0"/>
-                      </a:endParaRPr>
-                    </a:p>
-                  </a:txBody>
-                  <a:tcPr marL="6350" marR="6350" marT="6350" marB="0" anchor="b"/>
-                </a:tc>
-                <a:tc>
-                  <a:txBody>
-                    <a:bodyPr/>
-                    <a:lstStyle/>
-                    <a:p>
-                      <a:pPr algn="ctr" fontAlgn="b"/>
-                      <a:r>
-                        <a:rPr lang="ru-RU" sz="2400" b="1" u="none" strike="noStrike" dirty="0">
-                          <a:effectLst/>
-                        </a:rPr>
-                        <a:t>14:45</a:t>
-                      </a:r>
-                      <a:endParaRPr lang="ru-RU" sz="2400" b="1" i="0" u="none" strike="noStrike" dirty="0">
-                        <a:solidFill>
-                          <a:srgbClr val="000000"/>
-                        </a:solidFill>
-                        <a:effectLst/>
-                        <a:latin typeface="Calibri" panose="020F0502020204030204" pitchFamily="34" charset="0"/>
-                      </a:endParaRPr>
-                    </a:p>
-                  </a:txBody>
-                  <a:tcPr marL="6350" marR="6350" marT="6350" marB="0" anchor="b"/>
-                </a:tc>
-                <a:tc>
-                  <a:txBody>
-                    <a:bodyPr/>
-                    <a:lstStyle/>
-                    <a:p>
-                      <a:pPr algn="l" fontAlgn="b"/>
-                      <a:r>
-                        <a:rPr lang="en-US" sz="2400" u="none" strike="noStrike" dirty="0">
-                          <a:effectLst/>
-                        </a:rPr>
-                        <a:t>Log Analytics Dashboard Challenge</a:t>
-                      </a:r>
-                      <a:endParaRPr lang="en-US" sz="2400" b="0" i="0" u="none" strike="noStrike" dirty="0">
-                        <a:solidFill>
-                          <a:srgbClr val="000000"/>
-                        </a:solidFill>
-                        <a:effectLst/>
-                        <a:latin typeface="Calibri" panose="020F0502020204030204" pitchFamily="34" charset="0"/>
-                      </a:endParaRPr>
-                    </a:p>
-                  </a:txBody>
-                  <a:tcPr marL="6350" marR="6350" marT="6350" marB="0" anchor="b"/>
-                </a:tc>
-                <a:extLst>
-                  <a:ext uri="{0D108BD9-81ED-4DB2-BD59-A6C34878D82A}">
-                    <a16:rowId xmlns:a16="http://schemas.microsoft.com/office/drawing/2014/main" val="722797529"/>
-                  </a:ext>
-                </a:extLst>
-              </a:tr>
-              <a:tr h="801424">
-                <a:tc>
-                  <a:txBody>
-                    <a:bodyPr/>
-                    <a:lstStyle/>
-                    <a:p>
-                      <a:pPr algn="ctr" fontAlgn="b"/>
-                      <a:r>
-                        <a:rPr lang="ru-RU" sz="2400" b="1" u="none" strike="noStrike">
-                          <a:effectLst/>
-                        </a:rPr>
-                        <a:t>14:45</a:t>
-                      </a:r>
-                      <a:endParaRPr lang="ru-RU" sz="2400" b="1" i="0" u="none" strike="noStrike">
-                        <a:solidFill>
-                          <a:srgbClr val="000000"/>
-                        </a:solidFill>
-                        <a:effectLst/>
-                        <a:latin typeface="Calibri" panose="020F0502020204030204" pitchFamily="34" charset="0"/>
-                      </a:endParaRPr>
-                    </a:p>
-                  </a:txBody>
-                  <a:tcPr marL="6350" marR="6350" marT="6350" marB="0" anchor="b"/>
-                </a:tc>
-                <a:tc>
-                  <a:txBody>
-                    <a:bodyPr/>
-                    <a:lstStyle/>
-                    <a:p>
-                      <a:pPr algn="ctr" fontAlgn="b"/>
-                      <a:r>
-                        <a:rPr lang="ru-RU" sz="2400" b="1" u="none" strike="noStrike" dirty="0">
-                          <a:effectLst/>
-                        </a:rPr>
-                        <a:t>15:00</a:t>
-                      </a:r>
-                      <a:endParaRPr lang="ru-RU" sz="2400" b="1" i="0" u="none" strike="noStrike" dirty="0">
-                        <a:solidFill>
-                          <a:srgbClr val="000000"/>
-                        </a:solidFill>
-                        <a:effectLst/>
-                        <a:latin typeface="Calibri" panose="020F0502020204030204" pitchFamily="34" charset="0"/>
-                      </a:endParaRPr>
-                    </a:p>
-                  </a:txBody>
-                  <a:tcPr marL="6350" marR="6350" marT="6350" marB="0" anchor="b"/>
-                </a:tc>
-                <a:tc>
-                  <a:txBody>
-                    <a:bodyPr/>
-                    <a:lstStyle/>
-                    <a:p>
-                      <a:pPr algn="l" fontAlgn="b"/>
-                      <a:r>
-                        <a:rPr lang="en-US" sz="2400" u="none" strike="noStrike" dirty="0">
-                          <a:effectLst/>
-                        </a:rPr>
-                        <a:t>Coffee break</a:t>
-                      </a:r>
-                      <a:endParaRPr lang="en-US" sz="2400" b="0" i="0" u="none" strike="noStrike" dirty="0">
-                        <a:solidFill>
-                          <a:srgbClr val="000000"/>
-                        </a:solidFill>
-                        <a:effectLst/>
-                        <a:latin typeface="Calibri" panose="020F0502020204030204" pitchFamily="34" charset="0"/>
-                      </a:endParaRPr>
-                    </a:p>
-                  </a:txBody>
-                  <a:tcPr marL="6350" marR="6350" marT="6350" marB="0" anchor="b"/>
-                </a:tc>
-                <a:extLst>
-                  <a:ext uri="{0D108BD9-81ED-4DB2-BD59-A6C34878D82A}">
-                    <a16:rowId xmlns:a16="http://schemas.microsoft.com/office/drawing/2014/main" val="997855674"/>
-                  </a:ext>
-                </a:extLst>
-              </a:tr>
-              <a:tr h="408387">
-                <a:tc>
-                  <a:txBody>
-                    <a:bodyPr/>
-                    <a:lstStyle/>
-                    <a:p>
-                      <a:pPr algn="ctr" fontAlgn="b"/>
-                      <a:r>
-                        <a:rPr lang="ru-RU" sz="2400" b="1" u="none" strike="noStrike" dirty="0">
-                          <a:effectLst/>
-                        </a:rPr>
-                        <a:t>15:00</a:t>
-                      </a:r>
-                      <a:endParaRPr lang="ru-RU" sz="2400" b="1" i="0" u="none" strike="noStrike" dirty="0">
-                        <a:solidFill>
-                          <a:srgbClr val="000000"/>
-                        </a:solidFill>
-                        <a:effectLst/>
-                        <a:latin typeface="Calibri" panose="020F0502020204030204" pitchFamily="34" charset="0"/>
-                      </a:endParaRPr>
-                    </a:p>
-                  </a:txBody>
-                  <a:tcPr marL="6350" marR="6350" marT="6350" marB="0" anchor="b"/>
-                </a:tc>
-                <a:tc>
-                  <a:txBody>
-                    <a:bodyPr/>
-                    <a:lstStyle/>
-                    <a:p>
-                      <a:pPr algn="ctr" fontAlgn="b"/>
-                      <a:r>
-                        <a:rPr lang="ru-RU" sz="2400" b="1" u="none" strike="noStrike" dirty="0">
-                          <a:effectLst/>
-                        </a:rPr>
-                        <a:t>17:00</a:t>
-                      </a:r>
-                      <a:endParaRPr lang="ru-RU" sz="2400" b="1" i="0" u="none" strike="noStrike" dirty="0">
-                        <a:solidFill>
-                          <a:srgbClr val="000000"/>
-                        </a:solidFill>
-                        <a:effectLst/>
-                        <a:latin typeface="Calibri" panose="020F0502020204030204" pitchFamily="34" charset="0"/>
-                      </a:endParaRPr>
-                    </a:p>
-                  </a:txBody>
-                  <a:tcPr marL="6350" marR="6350" marT="6350" marB="0" anchor="b"/>
-                </a:tc>
-                <a:tc>
-                  <a:txBody>
-                    <a:bodyPr/>
-                    <a:lstStyle/>
-                    <a:p>
-                      <a:pPr algn="l" fontAlgn="b"/>
-                      <a:r>
-                        <a:rPr lang="en-US" sz="2400" u="none" strike="noStrike" dirty="0">
-                          <a:effectLst/>
-                        </a:rPr>
-                        <a:t>Log Analytics Challenges (complete)</a:t>
-                      </a:r>
-                      <a:endParaRPr lang="en-US" sz="2400" b="0" i="0" u="none" strike="noStrike" dirty="0">
-                        <a:solidFill>
-                          <a:srgbClr val="000000"/>
-                        </a:solidFill>
-                        <a:effectLst/>
-                        <a:latin typeface="Calibri" panose="020F0502020204030204" pitchFamily="34" charset="0"/>
-                      </a:endParaRPr>
-                    </a:p>
-                  </a:txBody>
-                  <a:tcPr marL="6350" marR="6350" marT="6350" marB="0" anchor="b"/>
-                </a:tc>
-                <a:extLst>
-                  <a:ext uri="{0D108BD9-81ED-4DB2-BD59-A6C34878D82A}">
-                    <a16:rowId xmlns:a16="http://schemas.microsoft.com/office/drawing/2014/main" val="251662871"/>
-                  </a:ext>
-                </a:extLst>
-              </a:tr>
-            </a:tbl>
-          </a:graphicData>
-        </a:graphic>
-      </p:graphicFrame>
-    </p:spTree>
-    <p:extLst>
-      <p:ext uri="{BB962C8B-B14F-4D97-AF65-F5344CB8AC3E}">
-        <p14:creationId xmlns:p14="http://schemas.microsoft.com/office/powerpoint/2010/main" val="979064255"/>
-      </p:ext>
-    </p:extLst>
-  </p:cSld>
-  <p:clrMapOvr>
-    <a:masterClrMapping/>
-  </p:clrMapOvr>
-</p:sld>
-</file>
-
-<file path=ppt/slides/slide4.xml><?xml version="1.0" encoding="utf-8"?>
-<p:sld xmlns:a="http://schemas.openxmlformats.org/drawingml/2006/main" xmlns:r="http://schemas.openxmlformats.org/officeDocument/2006/relationships" xmlns:p="http://schemas.openxmlformats.org/presentationml/2006/main">
-  <p:cSld>
-    <p:spTree>
-      <p:nvGrpSpPr>
-        <p:cNvPr id="1" name=""/>
-        <p:cNvGrpSpPr/>
-        <p:nvPr/>
-      </p:nvGrpSpPr>
-      <p:grpSpPr>
-        <a:xfrm>
-          <a:off x="0" y="0"/>
-          <a:ext cx="0" cy="0"/>
-          <a:chOff x="0" y="0"/>
-          <a:chExt cx="0" cy="0"/>
-        </a:xfrm>
-      </p:grpSpPr>
-      <p:sp>
-        <p:nvSpPr>
-          <p:cNvPr id="2" name="Title 1">
-            <a:extLst>
-              <a:ext uri="{FF2B5EF4-FFF2-40B4-BE49-F238E27FC236}">
                 <a16:creationId xmlns:a16="http://schemas.microsoft.com/office/drawing/2014/main" id="{B7319F75-02E7-492E-993C-436E919704BB}"/>
               </a:ext>
             </a:extLst>
@@ -6100,15 +5395,37 @@
               <a:rPr lang="en-US" dirty="0">
                 <a:hlinkClick r:id="rId3"/>
               </a:rPr>
-              <a:t>https://docs.microsoft.com/en-us/powershell/azure/install-azurerm-ps?view=azurermps-6.9.0</a:t>
-            </a:r>
-            <a:endParaRPr lang="en-US" dirty="0"/>
+              <a:t>Install Azure PowerShell with </a:t>
+            </a:r>
+            <a:r>
+              <a:rPr lang="en-US" dirty="0" err="1">
+                <a:hlinkClick r:id="rId3"/>
+              </a:rPr>
+              <a:t>PowerShellGet</a:t>
+            </a:r>
+            <a:r>
+              <a:rPr lang="en-US" dirty="0">
+                <a:hlinkClick r:id="rId3"/>
+              </a:rPr>
+              <a:t> | </a:t>
+            </a:r>
+            <a:r>
+              <a:rPr lang="en-US">
+                <a:hlinkClick r:id="rId3"/>
+              </a:rPr>
+              <a:t>Microsoft Docs</a:t>
+            </a:r>
+            <a:endParaRPr lang="en-US"/>
           </a:p>
           <a:p>
             <a:pPr lvl="1"/>
             <a:r>
+              <a:rPr lang="en-US"/>
+              <a:t>Install </a:t>
+            </a:r>
+            <a:r>
               <a:rPr lang="en-US" dirty="0"/>
-              <a:t>Install Visual Studio Code and Extensions (depending on your tool of choice)</a:t>
+              <a:t>Visual Studio Code and Extensions (depending on your tool of choice)</a:t>
             </a:r>
           </a:p>
           <a:p>
@@ -6206,7 +5523,7 @@
 </p:sld>
 </file>
 
-<file path=ppt/slides/slide5.xml><?xml version="1.0" encoding="utf-8"?>
+<file path=ppt/slides/slide4.xml><?xml version="1.0" encoding="utf-8"?>
 <p:sld xmlns:a="http://schemas.openxmlformats.org/drawingml/2006/main" xmlns:r="http://schemas.openxmlformats.org/officeDocument/2006/relationships" xmlns:p="http://schemas.openxmlformats.org/presentationml/2006/main">
   <p:cSld>
     <p:bg>
@@ -6464,6 +5781,335 @@
 </p:sld>
 </file>
 
+<file path=ppt/slides/slide5.xml><?xml version="1.0" encoding="utf-8"?>
+<p:sld xmlns:a="http://schemas.openxmlformats.org/drawingml/2006/main" xmlns:r="http://schemas.openxmlformats.org/officeDocument/2006/relationships" xmlns:p="http://schemas.openxmlformats.org/presentationml/2006/main">
+  <p:cSld>
+    <p:spTree>
+      <p:nvGrpSpPr>
+        <p:cNvPr id="1" name=""/>
+        <p:cNvGrpSpPr/>
+        <p:nvPr/>
+      </p:nvGrpSpPr>
+      <p:grpSpPr>
+        <a:xfrm>
+          <a:off x="0" y="0"/>
+          <a:ext cx="0" cy="0"/>
+          <a:chOff x="0" y="0"/>
+          <a:chExt cx="0" cy="0"/>
+        </a:xfrm>
+      </p:grpSpPr>
+      <p:sp>
+        <p:nvSpPr>
+          <p:cNvPr id="2" name="Title 1">
+            <a:extLst>
+              <a:ext uri="{FF2B5EF4-FFF2-40B4-BE49-F238E27FC236}">
+                <a16:creationId xmlns:a16="http://schemas.microsoft.com/office/drawing/2014/main" id="{60058EC1-5D04-4F24-9182-0E3316DEB259}"/>
+              </a:ext>
+            </a:extLst>
+          </p:cNvPr>
+          <p:cNvSpPr>
+            <a:spLocks noGrp="1"/>
+          </p:cNvSpPr>
+          <p:nvPr>
+            <p:ph type="title"/>
+          </p:nvPr>
+        </p:nvSpPr>
+        <p:spPr>
+          <a:xfrm>
+            <a:off x="838200" y="365125"/>
+            <a:ext cx="10515600" cy="991235"/>
+          </a:xfrm>
+        </p:spPr>
+        <p:txBody>
+          <a:bodyPr/>
+          <a:lstStyle/>
+          <a:p>
+            <a:r>
+              <a:rPr lang="en-US" sz="4000" dirty="0"/>
+              <a:t>Azure Monitor and Alert Rule Challenge	</a:t>
+            </a:r>
+          </a:p>
+        </p:txBody>
+      </p:sp>
+      <p:sp>
+        <p:nvSpPr>
+          <p:cNvPr id="3" name="Content Placeholder 2">
+            <a:extLst>
+              <a:ext uri="{FF2B5EF4-FFF2-40B4-BE49-F238E27FC236}">
+                <a16:creationId xmlns:a16="http://schemas.microsoft.com/office/drawing/2014/main" id="{F6074475-A229-48AD-8729-0FD1E62F0B0C}"/>
+              </a:ext>
+            </a:extLst>
+          </p:cNvPr>
+          <p:cNvSpPr>
+            <a:spLocks noGrp="1"/>
+          </p:cNvSpPr>
+          <p:nvPr>
+            <p:ph idx="1"/>
+          </p:nvPr>
+        </p:nvSpPr>
+        <p:spPr>
+          <a:xfrm>
+            <a:off x="434340" y="1434465"/>
+            <a:ext cx="10919460" cy="5120640"/>
+          </a:xfrm>
+        </p:spPr>
+        <p:txBody>
+          <a:bodyPr>
+            <a:normAutofit fontScale="85000" lnSpcReduction="20000"/>
+          </a:bodyPr>
+          <a:lstStyle/>
+          <a:p>
+            <a:r>
+              <a:rPr lang="en-US" sz="2000" dirty="0"/>
+              <a:t>Create an empty database called “</a:t>
+            </a:r>
+            <a:r>
+              <a:rPr lang="en-US" sz="2000" dirty="0" err="1">
+                <a:highlight>
+                  <a:srgbClr val="FFFF00"/>
+                </a:highlight>
+              </a:rPr>
+              <a:t>tpcc</a:t>
+            </a:r>
+            <a:r>
+              <a:rPr lang="en-US" sz="2000" dirty="0"/>
+              <a:t>” on the SQL Server</a:t>
+            </a:r>
+            <a:br>
+              <a:rPr lang="en-US" sz="2000" dirty="0"/>
+            </a:br>
+            <a:r>
+              <a:rPr lang="en-US" sz="2000" dirty="0"/>
+              <a:t>Note: Use SQL Auth with the username being </a:t>
+            </a:r>
+            <a:r>
+              <a:rPr lang="en-US" sz="2000" b="1" dirty="0" err="1">
+                <a:highlight>
+                  <a:srgbClr val="FFFF00"/>
+                </a:highlight>
+              </a:rPr>
+              <a:t>sqladmin</a:t>
+            </a:r>
+            <a:r>
+              <a:rPr lang="en-US" sz="2000" dirty="0"/>
+              <a:t> and password being whatever you used during deployment</a:t>
+            </a:r>
+          </a:p>
+          <a:p>
+            <a:r>
+              <a:rPr lang="en-US" sz="2000" dirty="0"/>
+              <a:t>Send the below guest OS metric to Azure Monitor for the SQL Server</a:t>
+            </a:r>
+          </a:p>
+          <a:p>
+            <a:pPr lvl="1"/>
+            <a:r>
+              <a:rPr lang="en-US" sz="1600" dirty="0"/>
+              <a:t>Add a Performance Counter Metric for </a:t>
+            </a:r>
+          </a:p>
+          <a:p>
+            <a:pPr lvl="2"/>
+            <a:r>
+              <a:rPr lang="en-US" sz="1400" b="1" dirty="0">
+                <a:highlight>
+                  <a:srgbClr val="FFFF00"/>
+                </a:highlight>
+              </a:rPr>
+              <a:t>Object: </a:t>
+            </a:r>
+            <a:r>
+              <a:rPr lang="en-US" sz="1400" b="1" dirty="0" err="1">
+                <a:highlight>
+                  <a:srgbClr val="FFFF00"/>
+                </a:highlight>
+              </a:rPr>
+              <a:t>SQLServer:Databases</a:t>
+            </a:r>
+            <a:r>
+              <a:rPr lang="en-US" sz="1400" b="1" dirty="0">
+                <a:highlight>
+                  <a:srgbClr val="FFFF00"/>
+                </a:highlight>
+              </a:rPr>
+              <a:t> </a:t>
+            </a:r>
+          </a:p>
+          <a:p>
+            <a:pPr lvl="2"/>
+            <a:r>
+              <a:rPr lang="en-US" sz="1400" b="1" dirty="0">
+                <a:highlight>
+                  <a:srgbClr val="FFFF00"/>
+                </a:highlight>
+              </a:rPr>
+              <a:t>Counter: Active Transactions</a:t>
+            </a:r>
+          </a:p>
+          <a:p>
+            <a:pPr lvl="2"/>
+            <a:r>
+              <a:rPr lang="en-US" sz="1400" dirty="0" err="1"/>
+              <a:t>Instance:tpcc</a:t>
+            </a:r>
+            <a:endParaRPr lang="en-US" sz="1400" dirty="0"/>
+          </a:p>
+          <a:p>
+            <a:pPr lvl="1"/>
+            <a:r>
+              <a:rPr lang="en-US" sz="1600" dirty="0"/>
+              <a:t>Hint: </a:t>
+            </a:r>
+            <a:r>
+              <a:rPr lang="en-US" sz="1600" dirty="0">
+                <a:hlinkClick r:id="rId3"/>
+              </a:rPr>
+              <a:t>https://docs.microsoft.com/en-us/azure/monitoring-and-diagnostics/metrics-store-custom-guestos-resource-manager-vm</a:t>
+            </a:r>
+            <a:endParaRPr lang="en-US" sz="1600" dirty="0"/>
+          </a:p>
+          <a:p>
+            <a:r>
+              <a:rPr lang="en-US" sz="2000" dirty="0"/>
+              <a:t>Download and Install </a:t>
+            </a:r>
+            <a:r>
+              <a:rPr lang="en-US" sz="2000" dirty="0" err="1"/>
+              <a:t>HammerDB</a:t>
+            </a:r>
+            <a:r>
+              <a:rPr lang="en-US" sz="2000" dirty="0"/>
+              <a:t> tool on the SQL Server VM (instructions are in your Student\Guides folder for setting up and using </a:t>
+            </a:r>
+            <a:r>
+              <a:rPr lang="en-US" sz="2000" dirty="0" err="1"/>
+              <a:t>Hammerdb</a:t>
+            </a:r>
+            <a:r>
+              <a:rPr lang="en-US" sz="2000" dirty="0"/>
+              <a:t>).</a:t>
+            </a:r>
+          </a:p>
+          <a:p>
+            <a:pPr lvl="1"/>
+            <a:r>
+              <a:rPr lang="en-US" sz="1600" dirty="0">
+                <a:hlinkClick r:id="rId4"/>
+              </a:rPr>
+              <a:t>www.hammerdb.com</a:t>
+            </a:r>
+            <a:endParaRPr lang="en-US" sz="2000" dirty="0"/>
+          </a:p>
+          <a:p>
+            <a:r>
+              <a:rPr lang="en-US" sz="2000" dirty="0"/>
+              <a:t>Use </a:t>
+            </a:r>
+            <a:r>
+              <a:rPr lang="en-US" sz="2000" dirty="0" err="1"/>
+              <a:t>HammerDB</a:t>
+            </a:r>
+            <a:r>
+              <a:rPr lang="en-US" sz="2000" dirty="0"/>
+              <a:t> to create transaction load</a:t>
+            </a:r>
+          </a:p>
+          <a:p>
+            <a:r>
+              <a:rPr lang="en-US" sz="2000" dirty="0"/>
+              <a:t>From Azure Monitor, create a graph for the SQL Server Active Transactions and Percent CPU and pin to your Azure Dashboard</a:t>
+            </a:r>
+          </a:p>
+          <a:p>
+            <a:pPr lvl="1"/>
+            <a:r>
+              <a:rPr lang="en-US" sz="1600" dirty="0"/>
+              <a:t>From Azure Monitor, create an Action group, to send email to your address</a:t>
+            </a:r>
+          </a:p>
+          <a:p>
+            <a:pPr lvl="1"/>
+            <a:r>
+              <a:rPr lang="en-US" sz="1600" dirty="0"/>
+              <a:t>Create an Alert </a:t>
+            </a:r>
+            <a:r>
+              <a:rPr lang="en-US" sz="1600" b="1" dirty="0">
+                <a:highlight>
+                  <a:srgbClr val="FFFF00"/>
+                </a:highlight>
+              </a:rPr>
+              <a:t>if Active Transactions goes over 40 on the SQL Server </a:t>
+            </a:r>
+            <a:r>
+              <a:rPr lang="en-US" sz="1600" b="1" dirty="0" err="1">
+                <a:highlight>
+                  <a:srgbClr val="FFFF00"/>
+                </a:highlight>
+              </a:rPr>
+              <a:t>tpcc</a:t>
+            </a:r>
+            <a:r>
+              <a:rPr lang="en-US" sz="1600" b="1" dirty="0">
+                <a:highlight>
+                  <a:srgbClr val="FFFF00"/>
+                </a:highlight>
+              </a:rPr>
+              <a:t> database</a:t>
+            </a:r>
+            <a:r>
+              <a:rPr lang="en-US" sz="1600" dirty="0"/>
+              <a:t>.</a:t>
+            </a:r>
+          </a:p>
+          <a:p>
+            <a:r>
+              <a:rPr lang="en-US" sz="2000" dirty="0"/>
+              <a:t>Create an Alert Rule for CPU over 75% on the Virtual Scale Set that emails me when you go over the threshold.</a:t>
+            </a:r>
+            <a:br>
+              <a:rPr lang="en-US" sz="2000" dirty="0"/>
+            </a:br>
+            <a:r>
+              <a:rPr lang="en-US" sz="2000" dirty="0"/>
+              <a:t>Note: In the Student\Resources\</a:t>
+            </a:r>
+            <a:r>
+              <a:rPr lang="en-US" sz="2000" dirty="0" err="1"/>
+              <a:t>Loadscripts</a:t>
+            </a:r>
+            <a:r>
+              <a:rPr lang="en-US" sz="2000" dirty="0"/>
+              <a:t> folder you will find a CPU load script to use.</a:t>
+            </a:r>
+          </a:p>
+          <a:p>
+            <a:r>
+              <a:rPr lang="en-US" sz="2000" dirty="0"/>
+              <a:t>First team to send me both alerts wins the challenge!!</a:t>
+            </a:r>
+          </a:p>
+          <a:p>
+            <a:r>
+              <a:rPr lang="en-US" sz="2000" dirty="0"/>
+              <a:t>Good luck!</a:t>
+            </a:r>
+          </a:p>
+        </p:txBody>
+      </p:sp>
+    </p:spTree>
+    <p:extLst>
+      <p:ext uri="{BB962C8B-B14F-4D97-AF65-F5344CB8AC3E}">
+        <p14:creationId xmlns:p14="http://schemas.microsoft.com/office/powerpoint/2010/main" val="2030375675"/>
+      </p:ext>
+    </p:extLst>
+  </p:cSld>
+  <p:clrMapOvr>
+    <a:masterClrMapping/>
+  </p:clrMapOvr>
+</p:sld>
+</file>
+
 <file path=ppt/slides/slide6.xml><?xml version="1.0" encoding="utf-8"?>
 <p:sld xmlns:a="http://schemas.openxmlformats.org/drawingml/2006/main" xmlns:r="http://schemas.openxmlformats.org/officeDocument/2006/relationships" xmlns:p="http://schemas.openxmlformats.org/presentationml/2006/main">
   <p:cSld>
@@ -6497,270 +6143,153 @@
             <p:ph type="title"/>
           </p:nvPr>
         </p:nvSpPr>
-        <p:spPr/>
-        <p:txBody>
-          <a:bodyPr/>
-          <a:lstStyle/>
-          <a:p>
-            <a:r>
-              <a:rPr lang="en-US" dirty="0"/>
-              <a:t>Monitoring and Alert Rule Challenge	</a:t>
-            </a:r>
-          </a:p>
-        </p:txBody>
-      </p:sp>
-      <p:sp>
-        <p:nvSpPr>
-          <p:cNvPr id="3" name="Content Placeholder 2">
-            <a:extLst>
-              <a:ext uri="{FF2B5EF4-FFF2-40B4-BE49-F238E27FC236}">
-                <a16:creationId xmlns:a16="http://schemas.microsoft.com/office/drawing/2014/main" id="{F6074475-A229-48AD-8729-0FD1E62F0B0C}"/>
-              </a:ext>
-            </a:extLst>
-          </p:cNvPr>
-          <p:cNvSpPr>
-            <a:spLocks noGrp="1"/>
-          </p:cNvSpPr>
-          <p:nvPr>
-            <p:ph idx="1"/>
-          </p:nvPr>
-        </p:nvSpPr>
         <p:spPr>
           <a:xfrm>
-            <a:off x="434340" y="1434465"/>
-            <a:ext cx="10919460" cy="5120640"/>
+            <a:off x="838200" y="365125"/>
+            <a:ext cx="10919460" cy="832739"/>
           </a:xfrm>
         </p:spPr>
         <p:txBody>
           <a:bodyPr>
-            <a:normAutofit fontScale="85000" lnSpcReduction="20000"/>
+            <a:normAutofit fontScale="90000"/>
           </a:bodyPr>
           <a:lstStyle/>
           <a:p>
             <a:r>
+              <a:rPr lang="en-US" dirty="0"/>
+              <a:t>Monitoring and Alert Rule Automation Challenge	</a:t>
+            </a:r>
+          </a:p>
+        </p:txBody>
+      </p:sp>
+      <p:sp>
+        <p:nvSpPr>
+          <p:cNvPr id="3" name="Content Placeholder 2">
+            <a:extLst>
+              <a:ext uri="{FF2B5EF4-FFF2-40B4-BE49-F238E27FC236}">
+                <a16:creationId xmlns:a16="http://schemas.microsoft.com/office/drawing/2014/main" id="{F6074475-A229-48AD-8729-0FD1E62F0B0C}"/>
+              </a:ext>
+            </a:extLst>
+          </p:cNvPr>
+          <p:cNvSpPr>
+            <a:spLocks noGrp="1"/>
+          </p:cNvSpPr>
+          <p:nvPr>
+            <p:ph idx="1"/>
+          </p:nvPr>
+        </p:nvSpPr>
+        <p:spPr>
+          <a:xfrm>
+            <a:off x="434339" y="1434465"/>
+            <a:ext cx="11100591" cy="5120640"/>
+          </a:xfrm>
+        </p:spPr>
+        <p:txBody>
+          <a:bodyPr>
+            <a:normAutofit/>
+          </a:bodyPr>
+          <a:lstStyle/>
+          <a:p>
+            <a:r>
               <a:rPr lang="en-US" sz="2000" dirty="0"/>
-              <a:t>Create an empty database called “</a:t>
+              <a:t>Update the parameters file and deployment script for the </a:t>
             </a:r>
             <a:r>
               <a:rPr lang="en-US" sz="2000" dirty="0" err="1"/>
-              <a:t>tpcc</a:t>
+              <a:t>GenerateAlertRules.json</a:t>
             </a:r>
             <a:r>
               <a:rPr lang="en-US" sz="2000" dirty="0"/>
-              <a:t>” on the SQL Server</a:t>
-            </a:r>
-            <a:br>
+              <a:t> template located in the </a:t>
+            </a:r>
+            <a:r>
+              <a:rPr lang="en-US" sz="2000" dirty="0" err="1"/>
+              <a:t>AlertTemplates</a:t>
+            </a:r>
+            <a:r>
               <a:rPr lang="en-US" sz="2000" dirty="0"/>
-            </a:br>
+              <a:t> folder</a:t>
+            </a:r>
+          </a:p>
+          <a:p>
+            <a:pPr lvl="1"/>
+            <a:r>
+              <a:rPr lang="en-US" sz="1600" dirty="0"/>
+              <a:t>Add the names of your VMs and </a:t>
+            </a:r>
+            <a:r>
+              <a:rPr lang="en-US" sz="1600" dirty="0" err="1"/>
+              <a:t>ResouceId</a:t>
+            </a:r>
+            <a:r>
+              <a:rPr lang="en-US" sz="1600" dirty="0"/>
+              <a:t> for your Action Group</a:t>
+            </a:r>
+          </a:p>
+          <a:p>
             <a:r>
               <a:rPr lang="en-US" sz="2000" dirty="0"/>
-              <a:t>Note: Use SQL Auth with the username being </a:t>
-            </a:r>
-            <a:r>
-              <a:rPr lang="en-US" sz="2000" b="1" dirty="0" err="1">
+              <a:t>Deploy the </a:t>
+            </a:r>
+            <a:r>
+              <a:rPr lang="en-US" sz="2000" dirty="0" err="1"/>
+              <a:t>GenerateAlertRules.json</a:t>
+            </a:r>
+            <a:r>
+              <a:rPr lang="en-US" sz="2000" dirty="0"/>
+              <a:t> template using the sample PowerShell script (deployAlertRulesTemplate.ps1) </a:t>
+            </a:r>
+          </a:p>
+          <a:p>
+            <a:r>
+              <a:rPr lang="en-US" sz="2000" dirty="0"/>
+              <a:t>Verify you have new Monitor Alert Rules in the Portal </a:t>
+            </a:r>
+          </a:p>
+          <a:p>
+            <a:r>
+              <a:rPr lang="en-US" sz="2000" dirty="0"/>
+              <a:t>Modify the </a:t>
+            </a:r>
+            <a:r>
+              <a:rPr lang="en-US" sz="2000" dirty="0" err="1"/>
+              <a:t>GenerateAlertsRules.json</a:t>
+            </a:r>
+            <a:r>
+              <a:rPr lang="en-US" sz="2000" dirty="0"/>
+              <a:t> to include </a:t>
+            </a:r>
+            <a:r>
+              <a:rPr lang="en-US" sz="2000" b="1" dirty="0">
                 <a:highlight>
                   <a:srgbClr val="FFFF00"/>
                 </a:highlight>
               </a:rPr>
-              <a:t>sqladmin</a:t>
+              <a:t>“Disk Write Operations/Sec” </a:t>
             </a:r>
             <a:r>
               <a:rPr lang="en-US" sz="2000" dirty="0"/>
-              <a:t> and password being whatever you used during deployment</a:t>
-            </a:r>
-          </a:p>
-          <a:p>
-            <a:r>
-              <a:rPr lang="en-US" sz="2000" dirty="0"/>
-              <a:t>From the ARM template, send the below guest OS metric to Azure Monitor for the SQL Server</a:t>
-            </a:r>
-          </a:p>
-          <a:p>
-            <a:pPr lvl="1"/>
-            <a:r>
-              <a:rPr lang="en-US" sz="1600" dirty="0"/>
-              <a:t>Add a Performance Counter Metric for </a:t>
-            </a:r>
-          </a:p>
-          <a:p>
-            <a:pPr lvl="2"/>
-            <a:r>
-              <a:rPr lang="en-US" sz="1400" b="1" dirty="0">
+              <a:t>and set a threshold of </a:t>
+            </a:r>
+            <a:r>
+              <a:rPr lang="en-US" sz="2000" b="1" dirty="0">
                 <a:highlight>
                   <a:srgbClr val="FFFF00"/>
                 </a:highlight>
               </a:rPr>
-              <a:t>Object: </a:t>
-            </a:r>
-            <a:r>
-              <a:rPr lang="en-US" sz="1400" b="1" dirty="0" err="1">
-                <a:highlight>
-                  <a:srgbClr val="FFFF00"/>
-                </a:highlight>
-              </a:rPr>
-              <a:t>SQLServer:Databases</a:t>
-            </a:r>
-            <a:r>
-              <a:rPr lang="en-US" sz="1400" b="1" dirty="0">
-                <a:highlight>
-                  <a:srgbClr val="FFFF00"/>
-                </a:highlight>
-              </a:rPr>
-              <a:t> </a:t>
-            </a:r>
-          </a:p>
-          <a:p>
-            <a:pPr lvl="2"/>
-            <a:r>
-              <a:rPr lang="en-US" sz="1400" b="1" dirty="0">
-                <a:highlight>
-                  <a:srgbClr val="FFFF00"/>
-                </a:highlight>
-              </a:rPr>
-              <a:t>Counter: Active Transactions</a:t>
-            </a:r>
-          </a:p>
-          <a:p>
-            <a:pPr lvl="2"/>
-            <a:r>
-              <a:rPr lang="en-US" sz="1400" dirty="0" err="1"/>
-              <a:t>Instance:tpcc</a:t>
-            </a:r>
-            <a:endParaRPr lang="en-US" sz="1400" dirty="0"/>
-          </a:p>
-          <a:p>
-            <a:pPr lvl="1"/>
-            <a:r>
-              <a:rPr lang="en-US" sz="1600" dirty="0"/>
-              <a:t>Hint: </a:t>
-            </a:r>
-            <a:r>
-              <a:rPr lang="en-US" sz="1600" dirty="0">
-                <a:hlinkClick r:id="rId3"/>
-              </a:rPr>
-              <a:t>https://docs.microsoft.com/en-us/azure/monitoring-and-diagnostics/metrics-store-custom-guestos-resource-manager-vm</a:t>
-            </a:r>
-            <a:endParaRPr lang="en-US" sz="1600" dirty="0"/>
+              <a:t>20</a:t>
+            </a:r>
           </a:p>
           <a:p>
             <a:r>
               <a:rPr lang="en-US" sz="2000" dirty="0"/>
-              <a:t>Download and Install </a:t>
-            </a:r>
-            <a:r>
-              <a:rPr lang="en-US" sz="2000" dirty="0" err="1"/>
-              <a:t>HammerDB</a:t>
-            </a:r>
+              <a:t>Rerun your template and verify your new Alert Rules are created for each of your VMs</a:t>
+            </a:r>
+          </a:p>
+          <a:p>
             <a:r>
               <a:rPr lang="en-US" sz="2000" dirty="0"/>
-              <a:t> tool on the SQL Server VM (instructions are in your Student\Guides folder for setting up and using </a:t>
-            </a:r>
-            <a:r>
-              <a:rPr lang="en-US" sz="2000" dirty="0" err="1"/>
-              <a:t>Hammerdb</a:t>
-            </a:r>
-            <a:r>
-              <a:rPr lang="en-US" sz="2000" dirty="0"/>
-              <a:t>).</a:t>
-            </a:r>
-          </a:p>
-          <a:p>
-            <a:pPr lvl="1"/>
-            <a:r>
-              <a:rPr lang="en-US" sz="1600" dirty="0">
-                <a:hlinkClick r:id="rId4"/>
-              </a:rPr>
-              <a:t>www.hammerdb.com</a:t>
-            </a:r>
-            <a:endParaRPr lang="en-US" sz="2000" dirty="0"/>
-          </a:p>
-          <a:p>
-            <a:r>
-              <a:rPr lang="en-US" sz="2000" dirty="0"/>
-              <a:t>Use </a:t>
-            </a:r>
-            <a:r>
-              <a:rPr lang="en-US" sz="2000" dirty="0" err="1"/>
-              <a:t>HammerDB</a:t>
-            </a:r>
-            <a:r>
-              <a:rPr lang="en-US" sz="2000" dirty="0"/>
-              <a:t> to create transaction load</a:t>
-            </a:r>
-          </a:p>
-          <a:p>
-            <a:r>
-              <a:rPr lang="en-US" sz="2000" dirty="0"/>
-              <a:t>From Azure Monitor, create a graph for the SQL Server Active Transactions and Percent CPU and pin to your Azure Dashboard</a:t>
-            </a:r>
-          </a:p>
-          <a:p>
-            <a:pPr lvl="1"/>
-            <a:r>
-              <a:rPr lang="en-US" sz="1600" dirty="0"/>
-              <a:t>From Azure Monitor, create an Action group, to send email to your address</a:t>
-            </a:r>
-          </a:p>
-          <a:p>
-            <a:pPr lvl="1"/>
-            <a:r>
-              <a:rPr lang="en-US" sz="1600" dirty="0"/>
-              <a:t>Create an Alert </a:t>
-            </a:r>
-            <a:r>
-              <a:rPr lang="en-US" sz="1600" b="1" dirty="0">
-                <a:highlight>
-                  <a:srgbClr val="FFFF00"/>
-                </a:highlight>
-              </a:rPr>
-              <a:t>if Active Transactions goes over 40 on the SQL Server </a:t>
-            </a:r>
-            <a:r>
-              <a:rPr lang="en-US" sz="1600" b="1" dirty="0" err="1">
-                <a:highlight>
-                  <a:srgbClr val="FFFF00"/>
-                </a:highlight>
-              </a:rPr>
-              <a:t>tpcc</a:t>
-            </a:r>
-            <a:r>
-              <a:rPr lang="en-US" sz="1600" b="1" dirty="0">
-                <a:highlight>
-                  <a:srgbClr val="FFFF00"/>
-                </a:highlight>
-              </a:rPr>
-              <a:t> database</a:t>
-            </a:r>
-            <a:r>
-              <a:rPr lang="en-US" sz="1600" dirty="0"/>
-              <a:t>.</a:t>
-            </a:r>
-          </a:p>
-          <a:p>
-            <a:r>
-              <a:rPr lang="en-US" sz="2000" dirty="0"/>
-              <a:t>Create an Alert Rule for CPU over 75% on the Virtual Scale Set that emails me when you go over the threshold.</a:t>
-            </a:r>
-            <a:br>
-              <a:rPr lang="en-US" sz="2000" dirty="0"/>
-            </a:br>
-            <a:r>
-              <a:rPr lang="en-US" sz="2000" dirty="0"/>
-              <a:t>Note: In the Student\Resources\</a:t>
-            </a:r>
-            <a:r>
-              <a:rPr lang="en-US" sz="2000" dirty="0" err="1"/>
-              <a:t>Loadscripts</a:t>
-            </a:r>
-            <a:r>
-              <a:rPr lang="en-US" sz="2000" dirty="0"/>
-              <a:t> folder you will find a CPU load script to use.</a:t>
-            </a:r>
-          </a:p>
-          <a:p>
-            <a:r>
-              <a:rPr lang="en-US" sz="2000" dirty="0"/>
-              <a:t>First team to send me both alerts wins the challenge!!</a:t>
+              <a:t>First team to me a screenshot of the new Alert Rules wins the challenge!!</a:t>
             </a:r>
           </a:p>
           <a:p>
@@ -6774,7 +6303,7 @@
     </p:spTree>
     <p:extLst>
       <p:ext uri="{BB962C8B-B14F-4D97-AF65-F5344CB8AC3E}">
-        <p14:creationId xmlns:p14="http://schemas.microsoft.com/office/powerpoint/2010/main" val="2030375675"/>
+        <p14:creationId xmlns:p14="http://schemas.microsoft.com/office/powerpoint/2010/main" val="3193180807"/>
       </p:ext>
     </p:extLst>
   </p:cSld>
@@ -6806,209 +6335,6 @@
           <p:cNvPr id="2" name="Title 1">
             <a:extLst>
               <a:ext uri="{FF2B5EF4-FFF2-40B4-BE49-F238E27FC236}">
-                <a16:creationId xmlns:a16="http://schemas.microsoft.com/office/drawing/2014/main" id="{60058EC1-5D04-4F24-9182-0E3316DEB259}"/>
-              </a:ext>
-            </a:extLst>
-          </p:cNvPr>
-          <p:cNvSpPr>
-            <a:spLocks noGrp="1"/>
-          </p:cNvSpPr>
-          <p:nvPr>
-            <p:ph type="title"/>
-          </p:nvPr>
-        </p:nvSpPr>
-        <p:spPr>
-          <a:xfrm>
-            <a:off x="838200" y="365125"/>
-            <a:ext cx="10919460" cy="832739"/>
-          </a:xfrm>
-        </p:spPr>
-        <p:txBody>
-          <a:bodyPr>
-            <a:normAutofit fontScale="90000"/>
-          </a:bodyPr>
-          <a:lstStyle/>
-          <a:p>
-            <a:r>
-              <a:rPr lang="en-US" dirty="0"/>
-              <a:t>Monitoring and Alert Rule Automation Challenge	</a:t>
-            </a:r>
-          </a:p>
-        </p:txBody>
-      </p:sp>
-      <p:sp>
-        <p:nvSpPr>
-          <p:cNvPr id="3" name="Content Placeholder 2">
-            <a:extLst>
-              <a:ext uri="{FF2B5EF4-FFF2-40B4-BE49-F238E27FC236}">
-                <a16:creationId xmlns:a16="http://schemas.microsoft.com/office/drawing/2014/main" id="{F6074475-A229-48AD-8729-0FD1E62F0B0C}"/>
-              </a:ext>
-            </a:extLst>
-          </p:cNvPr>
-          <p:cNvSpPr>
-            <a:spLocks noGrp="1"/>
-          </p:cNvSpPr>
-          <p:nvPr>
-            <p:ph idx="1"/>
-          </p:nvPr>
-        </p:nvSpPr>
-        <p:spPr>
-          <a:xfrm>
-            <a:off x="434339" y="1434465"/>
-            <a:ext cx="11100591" cy="5120640"/>
-          </a:xfrm>
-        </p:spPr>
-        <p:txBody>
-          <a:bodyPr>
-            <a:normAutofit/>
-          </a:bodyPr>
-          <a:lstStyle/>
-          <a:p>
-            <a:r>
-              <a:rPr lang="en-US" sz="2000" dirty="0"/>
-              <a:t>Update the parameters file and deployment script for the </a:t>
-            </a:r>
-            <a:r>
-              <a:rPr lang="en-US" sz="2000" dirty="0" err="1"/>
-              <a:t>GenerateAlertRules.json</a:t>
-            </a:r>
-            <a:r>
-              <a:rPr lang="en-US" sz="2000" dirty="0"/>
-              <a:t> template located in the </a:t>
-            </a:r>
-            <a:r>
-              <a:rPr lang="en-US" sz="2000" dirty="0" err="1"/>
-              <a:t>AlertTemplates</a:t>
-            </a:r>
-            <a:r>
-              <a:rPr lang="en-US" sz="2000" dirty="0"/>
-              <a:t> folder</a:t>
-            </a:r>
-          </a:p>
-          <a:p>
-            <a:pPr lvl="1"/>
-            <a:r>
-              <a:rPr lang="en-US" sz="1600" dirty="0"/>
-              <a:t>Add the names of your VMs and </a:t>
-            </a:r>
-            <a:r>
-              <a:rPr lang="en-US" sz="1600" dirty="0" err="1"/>
-              <a:t>ResouceId</a:t>
-            </a:r>
-            <a:r>
-              <a:rPr lang="en-US" sz="1600" dirty="0"/>
-              <a:t> for your Action Group</a:t>
-            </a:r>
-          </a:p>
-          <a:p>
-            <a:r>
-              <a:rPr lang="en-US" sz="2000" dirty="0"/>
-              <a:t>Deploy the </a:t>
-            </a:r>
-            <a:r>
-              <a:rPr lang="en-US" sz="2000" dirty="0" err="1"/>
-              <a:t>GenerateAlertRules.json</a:t>
-            </a:r>
-            <a:r>
-              <a:rPr lang="en-US" sz="2000" dirty="0"/>
-              <a:t> template using the sample PowerShell script (deployAlertRulesTemplate.ps1) </a:t>
-            </a:r>
-          </a:p>
-          <a:p>
-            <a:r>
-              <a:rPr lang="en-US" sz="2000" dirty="0"/>
-              <a:t>Verify you have new Monitor Alert Rules in the Portal </a:t>
-            </a:r>
-          </a:p>
-          <a:p>
-            <a:r>
-              <a:rPr lang="en-US" sz="2000" dirty="0"/>
-              <a:t>Modify the </a:t>
-            </a:r>
-            <a:r>
-              <a:rPr lang="en-US" sz="2000" dirty="0" err="1"/>
-              <a:t>GenerateAlertsRules.json</a:t>
-            </a:r>
-            <a:r>
-              <a:rPr lang="en-US" sz="2000" dirty="0"/>
-              <a:t> to include </a:t>
-            </a:r>
-            <a:r>
-              <a:rPr lang="en-US" sz="2000" b="1" dirty="0">
-                <a:highlight>
-                  <a:srgbClr val="FFFF00"/>
-                </a:highlight>
-              </a:rPr>
-              <a:t>“Disk Write Operations/Sec” </a:t>
-            </a:r>
-            <a:r>
-              <a:rPr lang="en-US" sz="2000" dirty="0"/>
-              <a:t>and set a threshold of </a:t>
-            </a:r>
-            <a:r>
-              <a:rPr lang="en-US" sz="2000" b="1" dirty="0">
-                <a:highlight>
-                  <a:srgbClr val="FFFF00"/>
-                </a:highlight>
-              </a:rPr>
-              <a:t>20</a:t>
-            </a:r>
-          </a:p>
-          <a:p>
-            <a:r>
-              <a:rPr lang="en-US" sz="2000" dirty="0"/>
-              <a:t>Rerun your template and verify your new Alert Rules are created for each of your VMs</a:t>
-            </a:r>
-          </a:p>
-          <a:p>
-            <a:r>
-              <a:rPr lang="en-US" sz="2000" dirty="0"/>
-              <a:t>First team to me a screenshot of the new Alert Rules wins the challenge!!</a:t>
-            </a:r>
-          </a:p>
-          <a:p>
-            <a:r>
-              <a:rPr lang="en-US" sz="2000" dirty="0"/>
-              <a:t>Good luck!</a:t>
-            </a:r>
-          </a:p>
-        </p:txBody>
-      </p:sp>
-    </p:spTree>
-    <p:extLst>
-      <p:ext uri="{BB962C8B-B14F-4D97-AF65-F5344CB8AC3E}">
-        <p14:creationId xmlns:p14="http://schemas.microsoft.com/office/powerpoint/2010/main" val="3193180807"/>
-      </p:ext>
-    </p:extLst>
-  </p:cSld>
-  <p:clrMapOvr>
-    <a:masterClrMapping/>
-  </p:clrMapOvr>
-</p:sld>
-</file>
-
-<file path=ppt/slides/slide8.xml><?xml version="1.0" encoding="utf-8"?>
-<p:sld xmlns:a="http://schemas.openxmlformats.org/drawingml/2006/main" xmlns:r="http://schemas.openxmlformats.org/officeDocument/2006/relationships" xmlns:p="http://schemas.openxmlformats.org/presentationml/2006/main">
-  <p:cSld>
-    <p:spTree>
-      <p:nvGrpSpPr>
-        <p:cNvPr id="1" name=""/>
-        <p:cNvGrpSpPr/>
-        <p:nvPr/>
-      </p:nvGrpSpPr>
-      <p:grpSpPr>
-        <a:xfrm>
-          <a:off x="0" y="0"/>
-          <a:ext cx="0" cy="0"/>
-          <a:chOff x="0" y="0"/>
-          <a:chExt cx="0" cy="0"/>
-        </a:xfrm>
-      </p:grpSpPr>
-      <p:sp>
-        <p:nvSpPr>
-          <p:cNvPr id="2" name="Title 1">
-            <a:extLst>
-              <a:ext uri="{FF2B5EF4-FFF2-40B4-BE49-F238E27FC236}">
                 <a16:creationId xmlns:a16="http://schemas.microsoft.com/office/drawing/2014/main" id="{9103BE6A-C3F7-45A9-AAB2-2D815440BC0A}"/>
               </a:ext>
             </a:extLst>
@@ -7056,7 +6382,7 @@
         </p:spPr>
         <p:txBody>
           <a:bodyPr>
-            <a:normAutofit fontScale="85000" lnSpcReduction="10000"/>
+            <a:normAutofit fontScale="92500" lnSpcReduction="20000"/>
           </a:bodyPr>
           <a:lstStyle/>
           <a:p>
@@ -7090,7 +6416,7 @@
             <a:pPr lvl="1"/>
             <a:r>
               <a:rPr lang="en-US" dirty="0"/>
-              <a:t>Add the following solutions: Activity Log Analytics, Service Map, Key Vault, Agent Health, Azure SQL Analytics, and Network Performance Monitor.</a:t>
+              <a:t>Enable VM Insights for all VMs</a:t>
             </a:r>
           </a:p>
           <a:p>
@@ -7103,7 +6429,7 @@
           <a:p>
             <a:r>
               <a:rPr lang="en-US" dirty="0"/>
-              <a:t>Deploy Service Map agents to Web Scale Set VMs and SQL Servers</a:t>
+              <a:t>Enable Service Map for Web Scale Set VMs and SQL Servers</a:t>
             </a:r>
           </a:p>
           <a:p>
@@ -7150,7 +6476,7 @@
 </p:sld>
 </file>
 
-<file path=ppt/slides/slide9.xml><?xml version="1.0" encoding="utf-8"?>
+<file path=ppt/slides/slide8.xml><?xml version="1.0" encoding="utf-8"?>
 <p:sld xmlns:a="http://schemas.openxmlformats.org/drawingml/2006/main" xmlns:r="http://schemas.openxmlformats.org/officeDocument/2006/relationships" xmlns:p="http://schemas.openxmlformats.org/presentationml/2006/main">
   <p:cSld>
     <p:spTree>
@@ -7902,4 +7228,10 @@
     </a:ext>
   </a:extLst>
 </a:theme>
+</file>
+
+<file path=docMetadata/LabelInfo.xml><?xml version="1.0" encoding="utf-8"?>
+<clbl:labelList xmlns:clbl="http://schemas.microsoft.com/office/2020/mipLabelMetadata">
+  <clbl:label id="{f42aa342-8706-4288-bd11-ebb85995028c}" enabled="1" method="Privileged" siteId="{72f988bf-86f1-41af-91ab-2d7cd011db47}" removed="0"/>
+</clbl:labelList>
 </file>
</xml_diff>